<commit_message>
[STABLE] Update on website, changes from unstable to stable/experimental in geometry and kinematics in preparation for 0.4 release.
</commit_message>
<xml_diff>
--- a/doc/images.pptx
+++ b/doc/images.pptx
@@ -8,6 +8,7 @@
     <p:sldId id="256" r:id="rId2"/>
     <p:sldId id="258" r:id="rId3"/>
     <p:sldId id="257" r:id="rId4"/>
+    <p:sldId id="259" r:id="rId5"/>
   </p:sldIdLst>
   <p:sldSz cx="12192000" cy="6858000"/>
   <p:notesSz cx="6858000" cy="9144000"/>
@@ -263,7 +264,7 @@
           <a:p>
             <a:fld id="{35C3687D-91A5-7C4D-919D-428BCA0C637B}" type="datetimeFigureOut">
               <a:rPr lang="fr-CA" smtClean="0"/>
-              <a:t>2020-12-03</a:t>
+              <a:t>2021-03-01</a:t>
             </a:fld>
             <a:endParaRPr lang="fr-CA"/>
           </a:p>
@@ -463,7 +464,7 @@
           <a:p>
             <a:fld id="{35C3687D-91A5-7C4D-919D-428BCA0C637B}" type="datetimeFigureOut">
               <a:rPr lang="fr-CA" smtClean="0"/>
-              <a:t>2020-12-03</a:t>
+              <a:t>2021-03-01</a:t>
             </a:fld>
             <a:endParaRPr lang="fr-CA"/>
           </a:p>
@@ -673,7 +674,7 @@
           <a:p>
             <a:fld id="{35C3687D-91A5-7C4D-919D-428BCA0C637B}" type="datetimeFigureOut">
               <a:rPr lang="fr-CA" smtClean="0"/>
-              <a:t>2020-12-03</a:t>
+              <a:t>2021-03-01</a:t>
             </a:fld>
             <a:endParaRPr lang="fr-CA"/>
           </a:p>
@@ -873,7 +874,7 @@
           <a:p>
             <a:fld id="{35C3687D-91A5-7C4D-919D-428BCA0C637B}" type="datetimeFigureOut">
               <a:rPr lang="fr-CA" smtClean="0"/>
-              <a:t>2020-12-03</a:t>
+              <a:t>2021-03-01</a:t>
             </a:fld>
             <a:endParaRPr lang="fr-CA"/>
           </a:p>
@@ -1149,7 +1150,7 @@
           <a:p>
             <a:fld id="{35C3687D-91A5-7C4D-919D-428BCA0C637B}" type="datetimeFigureOut">
               <a:rPr lang="fr-CA" smtClean="0"/>
-              <a:t>2020-12-03</a:t>
+              <a:t>2021-03-01</a:t>
             </a:fld>
             <a:endParaRPr lang="fr-CA"/>
           </a:p>
@@ -1417,7 +1418,7 @@
           <a:p>
             <a:fld id="{35C3687D-91A5-7C4D-919D-428BCA0C637B}" type="datetimeFigureOut">
               <a:rPr lang="fr-CA" smtClean="0"/>
-              <a:t>2020-12-03</a:t>
+              <a:t>2021-03-01</a:t>
             </a:fld>
             <a:endParaRPr lang="fr-CA"/>
           </a:p>
@@ -1832,7 +1833,7 @@
           <a:p>
             <a:fld id="{35C3687D-91A5-7C4D-919D-428BCA0C637B}" type="datetimeFigureOut">
               <a:rPr lang="fr-CA" smtClean="0"/>
-              <a:t>2020-12-03</a:t>
+              <a:t>2021-03-01</a:t>
             </a:fld>
             <a:endParaRPr lang="fr-CA"/>
           </a:p>
@@ -1974,7 +1975,7 @@
           <a:p>
             <a:fld id="{35C3687D-91A5-7C4D-919D-428BCA0C637B}" type="datetimeFigureOut">
               <a:rPr lang="fr-CA" smtClean="0"/>
-              <a:t>2020-12-03</a:t>
+              <a:t>2021-03-01</a:t>
             </a:fld>
             <a:endParaRPr lang="fr-CA"/>
           </a:p>
@@ -2087,7 +2088,7 @@
           <a:p>
             <a:fld id="{35C3687D-91A5-7C4D-919D-428BCA0C637B}" type="datetimeFigureOut">
               <a:rPr lang="fr-CA" smtClean="0"/>
-              <a:t>2020-12-03</a:t>
+              <a:t>2021-03-01</a:t>
             </a:fld>
             <a:endParaRPr lang="fr-CA"/>
           </a:p>
@@ -2400,7 +2401,7 @@
           <a:p>
             <a:fld id="{35C3687D-91A5-7C4D-919D-428BCA0C637B}" type="datetimeFigureOut">
               <a:rPr lang="fr-CA" smtClean="0"/>
-              <a:t>2020-12-03</a:t>
+              <a:t>2021-03-01</a:t>
             </a:fld>
             <a:endParaRPr lang="fr-CA"/>
           </a:p>
@@ -2689,7 +2690,7 @@
           <a:p>
             <a:fld id="{35C3687D-91A5-7C4D-919D-428BCA0C637B}" type="datetimeFigureOut">
               <a:rPr lang="fr-CA" smtClean="0"/>
-              <a:t>2020-12-03</a:t>
+              <a:t>2021-03-01</a:t>
             </a:fld>
             <a:endParaRPr lang="fr-CA"/>
           </a:p>
@@ -2932,7 +2933,7 @@
           <a:p>
             <a:fld id="{35C3687D-91A5-7C4D-919D-428BCA0C637B}" type="datetimeFigureOut">
               <a:rPr lang="fr-CA" smtClean="0"/>
-              <a:t>2020-12-03</a:t>
+              <a:t>2021-03-01</a:t>
             </a:fld>
             <a:endParaRPr lang="fr-CA"/>
           </a:p>
@@ -13610,6 +13611,782 @@
 </p:sld>
 </file>
 
+<file path=ppt/slides/slide4.xml><?xml version="1.0" encoding="utf-8"?>
+<p:sld xmlns:a="http://schemas.openxmlformats.org/drawingml/2006/main" xmlns:r="http://schemas.openxmlformats.org/officeDocument/2006/relationships" xmlns:p="http://schemas.openxmlformats.org/presentationml/2006/main">
+  <p:cSld>
+    <p:spTree>
+      <p:nvGrpSpPr>
+        <p:cNvPr id="1" name=""/>
+        <p:cNvGrpSpPr/>
+        <p:nvPr/>
+      </p:nvGrpSpPr>
+      <p:grpSpPr>
+        <a:xfrm>
+          <a:off x="0" y="0"/>
+          <a:ext cx="0" cy="0"/>
+          <a:chOff x="0" y="0"/>
+          <a:chExt cx="0" cy="0"/>
+        </a:xfrm>
+      </p:grpSpPr>
+      <p:grpSp>
+        <p:nvGrpSpPr>
+          <p:cNvPr id="14" name="Group 13">
+            <a:extLst>
+              <a:ext uri="{FF2B5EF4-FFF2-40B4-BE49-F238E27FC236}">
+                <a16:creationId xmlns:a16="http://schemas.microsoft.com/office/drawing/2014/main" id="{01E72083-5A3C-064B-95B6-961178EEAC04}"/>
+              </a:ext>
+            </a:extLst>
+          </p:cNvPr>
+          <p:cNvGrpSpPr/>
+          <p:nvPr/>
+        </p:nvGrpSpPr>
+        <p:grpSpPr>
+          <a:xfrm>
+            <a:off x="567012" y="147686"/>
+            <a:ext cx="3605645" cy="6385980"/>
+            <a:chOff x="1123603" y="-53705"/>
+            <a:chExt cx="3605645" cy="6385980"/>
+          </a:xfrm>
+        </p:grpSpPr>
+        <p:pic>
+          <p:nvPicPr>
+            <p:cNvPr id="2" name="Picture 1">
+              <a:extLst>
+                <a:ext uri="{FF2B5EF4-FFF2-40B4-BE49-F238E27FC236}">
+                  <a16:creationId xmlns:a16="http://schemas.microsoft.com/office/drawing/2014/main" id="{E009A9B9-669B-A840-A7D6-FF1AA2B8E458}"/>
+                </a:ext>
+              </a:extLst>
+            </p:cNvPr>
+            <p:cNvPicPr>
+              <a:picLocks noChangeAspect="1"/>
+            </p:cNvPicPr>
+            <p:nvPr/>
+          </p:nvPicPr>
+          <p:blipFill>
+            <a:blip r:embed="rId2">
+              <a:extLst>
+                <a:ext uri="{BEBA8EAE-BF5A-486C-A8C5-ECC9F3942E4B}">
+                  <a14:imgProps xmlns:a14="http://schemas.microsoft.com/office/drawing/2010/main">
+                    <a14:imgLayer r:embed="rId3">
+                      <a14:imgEffect>
+                        <a14:saturation sat="0"/>
+                      </a14:imgEffect>
+                    </a14:imgLayer>
+                  </a14:imgProps>
+                </a:ext>
+              </a:extLst>
+            </a:blip>
+            <a:stretch>
+              <a:fillRect/>
+            </a:stretch>
+          </p:blipFill>
+          <p:spPr>
+            <a:xfrm flipH="1">
+              <a:off x="1123603" y="222801"/>
+              <a:ext cx="3605645" cy="6079285"/>
+            </a:xfrm>
+            <a:prstGeom prst="rect">
+              <a:avLst/>
+            </a:prstGeom>
+          </p:spPr>
+        </p:pic>
+        <p:sp>
+          <p:nvSpPr>
+            <p:cNvPr id="3" name="TextBox 2">
+              <a:extLst>
+                <a:ext uri="{FF2B5EF4-FFF2-40B4-BE49-F238E27FC236}">
+                  <a16:creationId xmlns:a16="http://schemas.microsoft.com/office/drawing/2014/main" id="{C2BBF681-F0DE-6C4C-B88E-C3883FC750C8}"/>
+                </a:ext>
+              </a:extLst>
+            </p:cNvPr>
+            <p:cNvSpPr txBox="1"/>
+            <p:nvPr/>
+          </p:nvSpPr>
+          <p:spPr>
+            <a:xfrm>
+              <a:off x="2546927" y="1362983"/>
+              <a:ext cx="570990" cy="461665"/>
+            </a:xfrm>
+            <a:prstGeom prst="rect">
+              <a:avLst/>
+            </a:prstGeom>
+            <a:noFill/>
+          </p:spPr>
+          <p:txBody>
+            <a:bodyPr wrap="none" rtlCol="0">
+              <a:spAutoFit/>
+            </a:bodyPr>
+            <a:lstStyle/>
+            <a:p>
+              <a:r>
+                <a:rPr lang="fr-CA" sz="2400" noProof="1"/>
+                <a:t>GH</a:t>
+              </a:r>
+            </a:p>
+          </p:txBody>
+        </p:sp>
+        <p:sp>
+          <p:nvSpPr>
+            <p:cNvPr id="4" name="TextBox 3">
+              <a:extLst>
+                <a:ext uri="{FF2B5EF4-FFF2-40B4-BE49-F238E27FC236}">
+                  <a16:creationId xmlns:a16="http://schemas.microsoft.com/office/drawing/2014/main" id="{4CFF30BC-D86A-A64D-AE7A-79C0C8573BA9}"/>
+                </a:ext>
+              </a:extLst>
+            </p:cNvPr>
+            <p:cNvSpPr txBox="1"/>
+            <p:nvPr/>
+          </p:nvSpPr>
+          <p:spPr>
+            <a:xfrm>
+              <a:off x="3052650" y="4895757"/>
+              <a:ext cx="598241" cy="461665"/>
+            </a:xfrm>
+            <a:prstGeom prst="rect">
+              <a:avLst/>
+            </a:prstGeom>
+            <a:noFill/>
+          </p:spPr>
+          <p:txBody>
+            <a:bodyPr wrap="none" rtlCol="0">
+              <a:spAutoFit/>
+            </a:bodyPr>
+            <a:lstStyle/>
+            <a:p>
+              <a:r>
+                <a:rPr lang="fr-CA" sz="2400" noProof="1"/>
+                <a:t>EM</a:t>
+              </a:r>
+            </a:p>
+          </p:txBody>
+        </p:sp>
+        <p:sp>
+          <p:nvSpPr>
+            <p:cNvPr id="5" name="TextBox 4">
+              <a:extLst>
+                <a:ext uri="{FF2B5EF4-FFF2-40B4-BE49-F238E27FC236}">
+                  <a16:creationId xmlns:a16="http://schemas.microsoft.com/office/drawing/2014/main" id="{4AD324FC-583E-4946-B5DA-E2E80C9917AC}"/>
+                </a:ext>
+              </a:extLst>
+            </p:cNvPr>
+            <p:cNvSpPr txBox="1"/>
+            <p:nvPr/>
+          </p:nvSpPr>
+          <p:spPr>
+            <a:xfrm>
+              <a:off x="1630320" y="4810300"/>
+              <a:ext cx="465192" cy="461665"/>
+            </a:xfrm>
+            <a:prstGeom prst="rect">
+              <a:avLst/>
+            </a:prstGeom>
+            <a:noFill/>
+          </p:spPr>
+          <p:txBody>
+            <a:bodyPr wrap="none" rtlCol="0">
+              <a:spAutoFit/>
+            </a:bodyPr>
+            <a:lstStyle/>
+            <a:p>
+              <a:r>
+                <a:rPr lang="fr-CA" sz="2400" noProof="1"/>
+                <a:t>EL</a:t>
+              </a:r>
+            </a:p>
+          </p:txBody>
+        </p:sp>
+        <p:sp>
+          <p:nvSpPr>
+            <p:cNvPr id="6" name="Freeform 5">
+              <a:extLst>
+                <a:ext uri="{FF2B5EF4-FFF2-40B4-BE49-F238E27FC236}">
+                  <a16:creationId xmlns:a16="http://schemas.microsoft.com/office/drawing/2014/main" id="{67537482-2F79-9A41-BB9F-300E560B1018}"/>
+                </a:ext>
+              </a:extLst>
+            </p:cNvPr>
+            <p:cNvSpPr/>
+            <p:nvPr/>
+          </p:nvSpPr>
+          <p:spPr>
+            <a:xfrm flipH="1">
+              <a:off x="2137444" y="1302672"/>
+              <a:ext cx="1162229" cy="3828515"/>
+            </a:xfrm>
+            <a:custGeom>
+              <a:avLst/>
+              <a:gdLst>
+                <a:gd name="connsiteX0" fmla="*/ 0 w 1170774"/>
+                <a:gd name="connsiteY0" fmla="*/ 0 h 3811424"/>
+                <a:gd name="connsiteX1" fmla="*/ 358924 w 1170774"/>
+                <a:gd name="connsiteY1" fmla="*/ 3811424 h 3811424"/>
+                <a:gd name="connsiteX2" fmla="*/ 1170774 w 1170774"/>
+                <a:gd name="connsiteY2" fmla="*/ 3700329 h 3811424"/>
+                <a:gd name="connsiteX3" fmla="*/ 0 w 1170774"/>
+                <a:gd name="connsiteY3" fmla="*/ 0 h 3811424"/>
+                <a:gd name="connsiteX0" fmla="*/ 0 w 1170774"/>
+                <a:gd name="connsiteY0" fmla="*/ 0 h 3828515"/>
+                <a:gd name="connsiteX1" fmla="*/ 282012 w 1170774"/>
+                <a:gd name="connsiteY1" fmla="*/ 3828515 h 3828515"/>
+                <a:gd name="connsiteX2" fmla="*/ 1170774 w 1170774"/>
+                <a:gd name="connsiteY2" fmla="*/ 3700329 h 3828515"/>
+                <a:gd name="connsiteX3" fmla="*/ 0 w 1170774"/>
+                <a:gd name="connsiteY3" fmla="*/ 0 h 3828515"/>
+                <a:gd name="connsiteX0" fmla="*/ 0 w 1162229"/>
+                <a:gd name="connsiteY0" fmla="*/ 0 h 3828515"/>
+                <a:gd name="connsiteX1" fmla="*/ 282012 w 1162229"/>
+                <a:gd name="connsiteY1" fmla="*/ 3828515 h 3828515"/>
+                <a:gd name="connsiteX2" fmla="*/ 1162229 w 1162229"/>
+                <a:gd name="connsiteY2" fmla="*/ 3734512 h 3828515"/>
+                <a:gd name="connsiteX3" fmla="*/ 0 w 1162229"/>
+                <a:gd name="connsiteY3" fmla="*/ 0 h 3828515"/>
+              </a:gdLst>
+              <a:ahLst/>
+              <a:cxnLst>
+                <a:cxn ang="0">
+                  <a:pos x="connsiteX0" y="connsiteY0"/>
+                </a:cxn>
+                <a:cxn ang="0">
+                  <a:pos x="connsiteX1" y="connsiteY1"/>
+                </a:cxn>
+                <a:cxn ang="0">
+                  <a:pos x="connsiteX2" y="connsiteY2"/>
+                </a:cxn>
+                <a:cxn ang="0">
+                  <a:pos x="connsiteX3" y="connsiteY3"/>
+                </a:cxn>
+              </a:cxnLst>
+              <a:rect l="l" t="t" r="r" b="b"/>
+              <a:pathLst>
+                <a:path w="1162229" h="3828515">
+                  <a:moveTo>
+                    <a:pt x="0" y="0"/>
+                  </a:moveTo>
+                  <a:lnTo>
+                    <a:pt x="282012" y="3828515"/>
+                  </a:lnTo>
+                  <a:lnTo>
+                    <a:pt x="1162229" y="3734512"/>
+                  </a:lnTo>
+                  <a:lnTo>
+                    <a:pt x="0" y="0"/>
+                  </a:lnTo>
+                  <a:close/>
+                </a:path>
+              </a:pathLst>
+            </a:custGeom>
+            <a:solidFill>
+              <a:schemeClr val="accent4">
+                <a:alpha val="50000"/>
+              </a:schemeClr>
+            </a:solidFill>
+            <a:ln>
+              <a:noFill/>
+            </a:ln>
+            <a:effectLst/>
+          </p:spPr>
+          <p:style>
+            <a:lnRef idx="2">
+              <a:schemeClr val="accent1">
+                <a:shade val="50000"/>
+              </a:schemeClr>
+            </a:lnRef>
+            <a:fillRef idx="1">
+              <a:schemeClr val="accent1"/>
+            </a:fillRef>
+            <a:effectRef idx="0">
+              <a:schemeClr val="accent1"/>
+            </a:effectRef>
+            <a:fontRef idx="minor">
+              <a:schemeClr val="lt1"/>
+            </a:fontRef>
+          </p:style>
+          <p:txBody>
+            <a:bodyPr rtlCol="0" anchor="ctr"/>
+            <a:lstStyle/>
+            <a:p>
+              <a:pPr algn="ctr"/>
+              <a:endParaRPr lang="fr-CA" sz="2400" noProof="1"/>
+            </a:p>
+          </p:txBody>
+        </p:sp>
+        <p:cxnSp>
+          <p:nvCxnSpPr>
+            <p:cNvPr id="7" name="Straight Arrow Connector 6">
+              <a:extLst>
+                <a:ext uri="{FF2B5EF4-FFF2-40B4-BE49-F238E27FC236}">
+                  <a16:creationId xmlns:a16="http://schemas.microsoft.com/office/drawing/2014/main" id="{3EC6C3A6-53F8-D04F-8A4E-D03A33192B7C}"/>
+                </a:ext>
+              </a:extLst>
+            </p:cNvPr>
+            <p:cNvCxnSpPr>
+              <a:cxnSpLocks/>
+            </p:cNvCxnSpPr>
+            <p:nvPr/>
+          </p:nvCxnSpPr>
+          <p:spPr>
+            <a:xfrm flipV="1">
+              <a:off x="2586182" y="310247"/>
+              <a:ext cx="900491" cy="4778989"/>
+            </a:xfrm>
+            <a:prstGeom prst="straightConnector1">
+              <a:avLst/>
+            </a:prstGeom>
+            <a:ln w="76200">
+              <a:solidFill>
+                <a:srgbClr val="00FF00"/>
+              </a:solidFill>
+              <a:tailEnd type="triangle"/>
+            </a:ln>
+          </p:spPr>
+          <p:style>
+            <a:lnRef idx="1">
+              <a:schemeClr val="accent1"/>
+            </a:lnRef>
+            <a:fillRef idx="0">
+              <a:schemeClr val="accent1"/>
+            </a:fillRef>
+            <a:effectRef idx="0">
+              <a:schemeClr val="accent1"/>
+            </a:effectRef>
+            <a:fontRef idx="minor">
+              <a:schemeClr val="tx1"/>
+            </a:fontRef>
+          </p:style>
+        </p:cxnSp>
+        <p:cxnSp>
+          <p:nvCxnSpPr>
+            <p:cNvPr id="8" name="Straight Arrow Connector 7">
+              <a:extLst>
+                <a:ext uri="{FF2B5EF4-FFF2-40B4-BE49-F238E27FC236}">
+                  <a16:creationId xmlns:a16="http://schemas.microsoft.com/office/drawing/2014/main" id="{1AEB4B19-DD9E-EF45-A97E-1530ED66ED67}"/>
+                </a:ext>
+              </a:extLst>
+            </p:cNvPr>
+            <p:cNvCxnSpPr>
+              <a:cxnSpLocks/>
+            </p:cNvCxnSpPr>
+            <p:nvPr/>
+          </p:nvCxnSpPr>
+          <p:spPr>
+            <a:xfrm flipH="1" flipV="1">
+              <a:off x="2116414" y="1146133"/>
+              <a:ext cx="1126153" cy="263957"/>
+            </a:xfrm>
+            <a:prstGeom prst="straightConnector1">
+              <a:avLst/>
+            </a:prstGeom>
+            <a:ln w="76200">
+              <a:solidFill>
+                <a:srgbClr val="0000FF"/>
+              </a:solidFill>
+              <a:tailEnd type="triangle"/>
+            </a:ln>
+          </p:spPr>
+          <p:style>
+            <a:lnRef idx="1">
+              <a:schemeClr val="accent1"/>
+            </a:lnRef>
+            <a:fillRef idx="0">
+              <a:schemeClr val="accent1"/>
+            </a:fillRef>
+            <a:effectRef idx="0">
+              <a:schemeClr val="accent1"/>
+            </a:effectRef>
+            <a:fontRef idx="minor">
+              <a:schemeClr val="tx1"/>
+            </a:fontRef>
+          </p:style>
+        </p:cxnSp>
+        <p:sp>
+          <p:nvSpPr>
+            <p:cNvPr id="9" name="TextBox 8">
+              <a:extLst>
+                <a:ext uri="{FF2B5EF4-FFF2-40B4-BE49-F238E27FC236}">
+                  <a16:creationId xmlns:a16="http://schemas.microsoft.com/office/drawing/2014/main" id="{C4D5D18F-AC1E-254F-9933-426532B4E559}"/>
+                </a:ext>
+              </a:extLst>
+            </p:cNvPr>
+            <p:cNvSpPr txBox="1"/>
+            <p:nvPr/>
+          </p:nvSpPr>
+          <p:spPr>
+            <a:xfrm>
+              <a:off x="2051262" y="-53705"/>
+              <a:ext cx="827791" cy="461665"/>
+            </a:xfrm>
+            <a:prstGeom prst="rect">
+              <a:avLst/>
+            </a:prstGeom>
+            <a:noFill/>
+          </p:spPr>
+          <p:txBody>
+            <a:bodyPr wrap="none" rtlCol="0">
+              <a:spAutoFit/>
+            </a:bodyPr>
+            <a:lstStyle/>
+            <a:p>
+              <a:r>
+                <a:rPr lang="fr-CA" sz="2400" noProof="1"/>
+                <a:t>Right</a:t>
+              </a:r>
+            </a:p>
+          </p:txBody>
+        </p:sp>
+        <p:cxnSp>
+          <p:nvCxnSpPr>
+            <p:cNvPr id="10" name="Straight Arrow Connector 9">
+              <a:extLst>
+                <a:ext uri="{FF2B5EF4-FFF2-40B4-BE49-F238E27FC236}">
+                  <a16:creationId xmlns:a16="http://schemas.microsoft.com/office/drawing/2014/main" id="{AC2671BA-85AD-FC4E-B038-031FBE6AEFE9}"/>
+                </a:ext>
+              </a:extLst>
+            </p:cNvPr>
+            <p:cNvCxnSpPr/>
+            <p:nvPr/>
+          </p:nvCxnSpPr>
+          <p:spPr>
+            <a:xfrm flipH="1">
+              <a:off x="2147023" y="494913"/>
+              <a:ext cx="668260" cy="0"/>
+            </a:xfrm>
+            <a:prstGeom prst="straightConnector1">
+              <a:avLst/>
+            </a:prstGeom>
+            <a:ln>
+              <a:tailEnd type="triangle"/>
+            </a:ln>
+          </p:spPr>
+          <p:style>
+            <a:lnRef idx="1">
+              <a:schemeClr val="dk1"/>
+            </a:lnRef>
+            <a:fillRef idx="0">
+              <a:schemeClr val="dk1"/>
+            </a:fillRef>
+            <a:effectRef idx="0">
+              <a:schemeClr val="dk1"/>
+            </a:effectRef>
+            <a:fontRef idx="minor">
+              <a:schemeClr val="tx1"/>
+            </a:fontRef>
+          </p:style>
+        </p:cxnSp>
+        <p:sp>
+          <p:nvSpPr>
+            <p:cNvPr id="11" name="TextBox 10">
+              <a:extLst>
+                <a:ext uri="{FF2B5EF4-FFF2-40B4-BE49-F238E27FC236}">
+                  <a16:creationId xmlns:a16="http://schemas.microsoft.com/office/drawing/2014/main" id="{32403CF6-CD42-6E43-9577-2578619B4DB8}"/>
+                </a:ext>
+              </a:extLst>
+            </p:cNvPr>
+            <p:cNvSpPr txBox="1"/>
+            <p:nvPr/>
+          </p:nvSpPr>
+          <p:spPr>
+            <a:xfrm>
+              <a:off x="2718558" y="5870610"/>
+              <a:ext cx="1872949" cy="461665"/>
+            </a:xfrm>
+            <a:prstGeom prst="rect">
+              <a:avLst/>
+            </a:prstGeom>
+            <a:noFill/>
+          </p:spPr>
+          <p:txBody>
+            <a:bodyPr wrap="none" rtlCol="0">
+              <a:spAutoFit/>
+            </a:bodyPr>
+            <a:lstStyle/>
+            <a:p>
+              <a:r>
+                <a:rPr lang="fr-CA" sz="2400" noProof="1"/>
+                <a:t>Anterior view</a:t>
+              </a:r>
+            </a:p>
+          </p:txBody>
+        </p:sp>
+        <p:sp>
+          <p:nvSpPr>
+            <p:cNvPr id="12" name="Oval 11">
+              <a:extLst>
+                <a:ext uri="{FF2B5EF4-FFF2-40B4-BE49-F238E27FC236}">
+                  <a16:creationId xmlns:a16="http://schemas.microsoft.com/office/drawing/2014/main" id="{AA6B7A48-98F4-0049-8CAB-DF301E288822}"/>
+                </a:ext>
+              </a:extLst>
+            </p:cNvPr>
+            <p:cNvSpPr>
+              <a:spLocks noChangeAspect="1"/>
+            </p:cNvSpPr>
+            <p:nvPr/>
+          </p:nvSpPr>
+          <p:spPr>
+            <a:xfrm>
+              <a:off x="3216910" y="1349443"/>
+              <a:ext cx="147600" cy="147600"/>
+            </a:xfrm>
+            <a:prstGeom prst="ellipse">
+              <a:avLst/>
+            </a:prstGeom>
+            <a:solidFill>
+              <a:schemeClr val="bg1"/>
+            </a:solidFill>
+            <a:ln w="76200">
+              <a:solidFill>
+                <a:srgbClr val="FF0000"/>
+              </a:solidFill>
+            </a:ln>
+          </p:spPr>
+          <p:style>
+            <a:lnRef idx="2">
+              <a:schemeClr val="accent1">
+                <a:shade val="50000"/>
+              </a:schemeClr>
+            </a:lnRef>
+            <a:fillRef idx="1">
+              <a:schemeClr val="accent1"/>
+            </a:fillRef>
+            <a:effectRef idx="0">
+              <a:schemeClr val="accent1"/>
+            </a:effectRef>
+            <a:fontRef idx="minor">
+              <a:schemeClr val="lt1"/>
+            </a:fontRef>
+          </p:style>
+          <p:txBody>
+            <a:bodyPr rtlCol="0" anchor="ctr"/>
+            <a:lstStyle/>
+            <a:p>
+              <a:pPr algn="ctr"/>
+              <a:endParaRPr lang="fr-CA" sz="2400" noProof="1"/>
+            </a:p>
+          </p:txBody>
+        </p:sp>
+        <p:cxnSp>
+          <p:nvCxnSpPr>
+            <p:cNvPr id="13" name="Straight Arrow Connector 12">
+              <a:extLst>
+                <a:ext uri="{FF2B5EF4-FFF2-40B4-BE49-F238E27FC236}">
+                  <a16:creationId xmlns:a16="http://schemas.microsoft.com/office/drawing/2014/main" id="{B9E103C0-6FE4-FC4E-AE04-59906775AFAA}"/>
+                </a:ext>
+              </a:extLst>
+            </p:cNvPr>
+            <p:cNvCxnSpPr>
+              <a:cxnSpLocks/>
+            </p:cNvCxnSpPr>
+            <p:nvPr/>
+          </p:nvCxnSpPr>
+          <p:spPr>
+            <a:xfrm flipH="1" flipV="1">
+              <a:off x="2116414" y="5041133"/>
+              <a:ext cx="878636" cy="48103"/>
+            </a:xfrm>
+            <a:prstGeom prst="straightConnector1">
+              <a:avLst/>
+            </a:prstGeom>
+            <a:ln w="76200">
+              <a:solidFill>
+                <a:schemeClr val="accent4"/>
+              </a:solidFill>
+              <a:tailEnd type="triangle"/>
+            </a:ln>
+          </p:spPr>
+          <p:style>
+            <a:lnRef idx="1">
+              <a:schemeClr val="accent1"/>
+            </a:lnRef>
+            <a:fillRef idx="0">
+              <a:schemeClr val="accent1"/>
+            </a:fillRef>
+            <a:effectRef idx="0">
+              <a:schemeClr val="accent1"/>
+            </a:effectRef>
+            <a:fontRef idx="minor">
+              <a:schemeClr val="tx1"/>
+            </a:fontRef>
+          </p:style>
+        </p:cxnSp>
+      </p:grpSp>
+      <p:sp>
+        <p:nvSpPr>
+          <p:cNvPr id="15" name="TextBox 14">
+            <a:extLst>
+              <a:ext uri="{FF2B5EF4-FFF2-40B4-BE49-F238E27FC236}">
+                <a16:creationId xmlns:a16="http://schemas.microsoft.com/office/drawing/2014/main" id="{7C4DAE0C-84E0-BD47-BD4F-CF0F11437929}"/>
+              </a:ext>
+            </a:extLst>
+          </p:cNvPr>
+          <p:cNvSpPr txBox="1"/>
+          <p:nvPr/>
+        </p:nvSpPr>
+        <p:spPr>
+          <a:xfrm>
+            <a:off x="2423465" y="1143303"/>
+            <a:ext cx="325730" cy="461665"/>
+          </a:xfrm>
+          <a:prstGeom prst="rect">
+            <a:avLst/>
+          </a:prstGeom>
+          <a:noFill/>
+          <a:effectLst>
+            <a:outerShdw blurRad="50800" dist="38100" dir="5400000" algn="t" rotWithShape="0">
+              <a:schemeClr val="bg1">
+                <a:alpha val="40000"/>
+              </a:schemeClr>
+            </a:outerShdw>
+          </a:effectLst>
+        </p:spPr>
+        <p:txBody>
+          <a:bodyPr wrap="none" rtlCol="0">
+            <a:spAutoFit/>
+          </a:bodyPr>
+          <a:lstStyle/>
+          <a:p>
+            <a:r>
+              <a:rPr lang="fr-CA" sz="2400" b="1" dirty="0">
+                <a:solidFill>
+                  <a:srgbClr val="FF0000"/>
+                </a:solidFill>
+              </a:rPr>
+              <a:t>x</a:t>
+            </a:r>
+          </a:p>
+        </p:txBody>
+      </p:sp>
+      <p:sp>
+        <p:nvSpPr>
+          <p:cNvPr id="16" name="Rectangle 15">
+            <a:extLst>
+              <a:ext uri="{FF2B5EF4-FFF2-40B4-BE49-F238E27FC236}">
+                <a16:creationId xmlns:a16="http://schemas.microsoft.com/office/drawing/2014/main" id="{8F722FED-FAF1-2642-A958-F0BFE2A409C6}"/>
+              </a:ext>
+            </a:extLst>
+          </p:cNvPr>
+          <p:cNvSpPr/>
+          <p:nvPr/>
+        </p:nvSpPr>
+        <p:spPr>
+          <a:xfrm>
+            <a:off x="2993250" y="378518"/>
+            <a:ext cx="324128" cy="461665"/>
+          </a:xfrm>
+          <a:prstGeom prst="rect">
+            <a:avLst/>
+          </a:prstGeom>
+        </p:spPr>
+        <p:txBody>
+          <a:bodyPr wrap="none">
+            <a:spAutoFit/>
+          </a:bodyPr>
+          <a:lstStyle/>
+          <a:p>
+            <a:r>
+              <a:rPr lang="fr-CA" sz="2400" noProof="1">
+                <a:solidFill>
+                  <a:srgbClr val="00FF00"/>
+                </a:solidFill>
+              </a:rPr>
+              <a:t>y</a:t>
+            </a:r>
+            <a:endParaRPr lang="fr-CA" sz="2400" dirty="0">
+              <a:solidFill>
+                <a:srgbClr val="00FF00"/>
+              </a:solidFill>
+            </a:endParaRPr>
+          </a:p>
+        </p:txBody>
+      </p:sp>
+      <p:sp>
+        <p:nvSpPr>
+          <p:cNvPr id="17" name="Rectangle 16">
+            <a:extLst>
+              <a:ext uri="{FF2B5EF4-FFF2-40B4-BE49-F238E27FC236}">
+                <a16:creationId xmlns:a16="http://schemas.microsoft.com/office/drawing/2014/main" id="{91EC685D-FB05-3345-9872-443FDBCABB68}"/>
+              </a:ext>
+            </a:extLst>
+          </p:cNvPr>
+          <p:cNvSpPr/>
+          <p:nvPr/>
+        </p:nvSpPr>
+        <p:spPr>
+          <a:xfrm>
+            <a:off x="1299563" y="983572"/>
+            <a:ext cx="306494" cy="461665"/>
+          </a:xfrm>
+          <a:prstGeom prst="rect">
+            <a:avLst/>
+          </a:prstGeom>
+        </p:spPr>
+        <p:txBody>
+          <a:bodyPr wrap="none">
+            <a:spAutoFit/>
+          </a:bodyPr>
+          <a:lstStyle/>
+          <a:p>
+            <a:r>
+              <a:rPr lang="fr-CA" sz="2400" noProof="1">
+                <a:solidFill>
+                  <a:srgbClr val="0000FF"/>
+                </a:solidFill>
+              </a:rPr>
+              <a:t>z</a:t>
+            </a:r>
+            <a:endParaRPr lang="fr-CA" sz="2400" dirty="0">
+              <a:solidFill>
+                <a:srgbClr val="0000FF"/>
+              </a:solidFill>
+            </a:endParaRPr>
+          </a:p>
+        </p:txBody>
+      </p:sp>
+      <p:sp>
+        <p:nvSpPr>
+          <p:cNvPr id="18" name="TextBox 17">
+            <a:extLst>
+              <a:ext uri="{FF2B5EF4-FFF2-40B4-BE49-F238E27FC236}">
+                <a16:creationId xmlns:a16="http://schemas.microsoft.com/office/drawing/2014/main" id="{B61F53C0-E248-194A-A29F-93D4B56B96C4}"/>
+              </a:ext>
+            </a:extLst>
+          </p:cNvPr>
+          <p:cNvSpPr txBox="1"/>
+          <p:nvPr/>
+        </p:nvSpPr>
+        <p:spPr>
+          <a:xfrm>
+            <a:off x="2761861" y="1512623"/>
+            <a:ext cx="901209" cy="461665"/>
+          </a:xfrm>
+          <a:prstGeom prst="rect">
+            <a:avLst/>
+          </a:prstGeom>
+          <a:noFill/>
+        </p:spPr>
+        <p:txBody>
+          <a:bodyPr wrap="none" rtlCol="0">
+            <a:spAutoFit/>
+          </a:bodyPr>
+          <a:lstStyle/>
+          <a:p>
+            <a:r>
+              <a:rPr lang="fr-CA" sz="2400" noProof="1"/>
+              <a:t>origin</a:t>
+            </a:r>
+          </a:p>
+        </p:txBody>
+      </p:sp>
+    </p:spTree>
+    <p:extLst>
+      <p:ext uri="{BB962C8B-B14F-4D97-AF65-F5344CB8AC3E}">
+        <p14:creationId xmlns:p14="http://schemas.microsoft.com/office/powerpoint/2010/main" val="2893060349"/>
+      </p:ext>
+    </p:extLst>
+  </p:cSld>
+  <p:clrMapOvr>
+    <a:masterClrMapping/>
+  </p:clrMapOvr>
+</p:sld>
+</file>
+
 <file path=ppt/theme/theme1.xml><?xml version="1.0" encoding="utf-8"?>
 <a:theme xmlns:a="http://schemas.openxmlformats.org/drawingml/2006/main" name="Office Theme">
   <a:themeElements>

</xml_diff>

<commit_message>
[STABLE] Adapted the nomenclature in ktk.geometry, according to the terms used in the Rigid body geometry basics.
</commit_message>
<xml_diff>
--- a/doc/images.pptx
+++ b/doc/images.pptx
@@ -267,7 +267,7 @@
           <a:p>
             <a:fld id="{35C3687D-91A5-7C4D-919D-428BCA0C637B}" type="datetimeFigureOut">
               <a:rPr lang="fr-CA" smtClean="0"/>
-              <a:t>2021-03-08</a:t>
+              <a:t>2021-03-09</a:t>
             </a:fld>
             <a:endParaRPr lang="fr-CA"/>
           </a:p>
@@ -467,7 +467,7 @@
           <a:p>
             <a:fld id="{35C3687D-91A5-7C4D-919D-428BCA0C637B}" type="datetimeFigureOut">
               <a:rPr lang="fr-CA" smtClean="0"/>
-              <a:t>2021-03-08</a:t>
+              <a:t>2021-03-09</a:t>
             </a:fld>
             <a:endParaRPr lang="fr-CA"/>
           </a:p>
@@ -677,7 +677,7 @@
           <a:p>
             <a:fld id="{35C3687D-91A5-7C4D-919D-428BCA0C637B}" type="datetimeFigureOut">
               <a:rPr lang="fr-CA" smtClean="0"/>
-              <a:t>2021-03-08</a:t>
+              <a:t>2021-03-09</a:t>
             </a:fld>
             <a:endParaRPr lang="fr-CA"/>
           </a:p>
@@ -877,7 +877,7 @@
           <a:p>
             <a:fld id="{35C3687D-91A5-7C4D-919D-428BCA0C637B}" type="datetimeFigureOut">
               <a:rPr lang="fr-CA" smtClean="0"/>
-              <a:t>2021-03-08</a:t>
+              <a:t>2021-03-09</a:t>
             </a:fld>
             <a:endParaRPr lang="fr-CA"/>
           </a:p>
@@ -1153,7 +1153,7 @@
           <a:p>
             <a:fld id="{35C3687D-91A5-7C4D-919D-428BCA0C637B}" type="datetimeFigureOut">
               <a:rPr lang="fr-CA" smtClean="0"/>
-              <a:t>2021-03-08</a:t>
+              <a:t>2021-03-09</a:t>
             </a:fld>
             <a:endParaRPr lang="fr-CA"/>
           </a:p>
@@ -1421,7 +1421,7 @@
           <a:p>
             <a:fld id="{35C3687D-91A5-7C4D-919D-428BCA0C637B}" type="datetimeFigureOut">
               <a:rPr lang="fr-CA" smtClean="0"/>
-              <a:t>2021-03-08</a:t>
+              <a:t>2021-03-09</a:t>
             </a:fld>
             <a:endParaRPr lang="fr-CA"/>
           </a:p>
@@ -1836,7 +1836,7 @@
           <a:p>
             <a:fld id="{35C3687D-91A5-7C4D-919D-428BCA0C637B}" type="datetimeFigureOut">
               <a:rPr lang="fr-CA" smtClean="0"/>
-              <a:t>2021-03-08</a:t>
+              <a:t>2021-03-09</a:t>
             </a:fld>
             <a:endParaRPr lang="fr-CA"/>
           </a:p>
@@ -1978,7 +1978,7 @@
           <a:p>
             <a:fld id="{35C3687D-91A5-7C4D-919D-428BCA0C637B}" type="datetimeFigureOut">
               <a:rPr lang="fr-CA" smtClean="0"/>
-              <a:t>2021-03-08</a:t>
+              <a:t>2021-03-09</a:t>
             </a:fld>
             <a:endParaRPr lang="fr-CA"/>
           </a:p>
@@ -2091,7 +2091,7 @@
           <a:p>
             <a:fld id="{35C3687D-91A5-7C4D-919D-428BCA0C637B}" type="datetimeFigureOut">
               <a:rPr lang="fr-CA" smtClean="0"/>
-              <a:t>2021-03-08</a:t>
+              <a:t>2021-03-09</a:t>
             </a:fld>
             <a:endParaRPr lang="fr-CA"/>
           </a:p>
@@ -2404,7 +2404,7 @@
           <a:p>
             <a:fld id="{35C3687D-91A5-7C4D-919D-428BCA0C637B}" type="datetimeFigureOut">
               <a:rPr lang="fr-CA" smtClean="0"/>
-              <a:t>2021-03-08</a:t>
+              <a:t>2021-03-09</a:t>
             </a:fld>
             <a:endParaRPr lang="fr-CA"/>
           </a:p>
@@ -2693,7 +2693,7 @@
           <a:p>
             <a:fld id="{35C3687D-91A5-7C4D-919D-428BCA0C637B}" type="datetimeFigureOut">
               <a:rPr lang="fr-CA" smtClean="0"/>
-              <a:t>2021-03-08</a:t>
+              <a:t>2021-03-09</a:t>
             </a:fld>
             <a:endParaRPr lang="fr-CA"/>
           </a:p>
@@ -2936,7 +2936,7 @@
           <a:p>
             <a:fld id="{35C3687D-91A5-7C4D-919D-428BCA0C637B}" type="datetimeFigureOut">
               <a:rPr lang="fr-CA" smtClean="0"/>
-              <a:t>2021-03-08</a:t>
+              <a:t>2021-03-09</a:t>
             </a:fld>
             <a:endParaRPr lang="fr-CA"/>
           </a:p>
@@ -17866,8 +17866,8 @@
             </p:txBody>
           </p:sp>
         </p:grpSp>
-        <mc:AlternateContent xmlns:mc="http://schemas.openxmlformats.org/markup-compatibility/2006">
-          <mc:Choice xmlns:a14="http://schemas.microsoft.com/office/drawing/2010/main" Requires="a14">
+        <mc:AlternateContent xmlns:mc="http://schemas.openxmlformats.org/markup-compatibility/2006" xmlns:a14="http://schemas.microsoft.com/office/drawing/2010/main">
+          <mc:Choice Requires="a14">
             <p:sp>
               <p:nvSpPr>
                 <p:cNvPr id="217" name="TextBox 216">
@@ -17917,7 +17917,7 @@
               </p:txBody>
             </p:sp>
           </mc:Choice>
-          <mc:Fallback>
+          <mc:Fallback xmlns="">
             <p:sp>
               <p:nvSpPr>
                 <p:cNvPr id="217" name="TextBox 216">
@@ -18478,50 +18478,12 @@
           <a:chExt cx="0" cy="0"/>
         </a:xfrm>
       </p:grpSpPr>
-      <p:cxnSp>
-        <p:nvCxnSpPr>
-          <p:cNvPr id="39" name="Straight Connector 38">
+      <p:sp>
+        <p:nvSpPr>
+          <p:cNvPr id="38" name="Arc 37">
             <a:extLst>
               <a:ext uri="{FF2B5EF4-FFF2-40B4-BE49-F238E27FC236}">
-                <a16:creationId xmlns:a16="http://schemas.microsoft.com/office/drawing/2014/main" id="{EB083664-865A-924C-83EF-DEED28F56977}"/>
-              </a:ext>
-            </a:extLst>
-          </p:cNvPr>
-          <p:cNvCxnSpPr>
-            <a:cxnSpLocks/>
-          </p:cNvCxnSpPr>
-          <p:nvPr/>
-        </p:nvCxnSpPr>
-        <p:spPr>
-          <a:xfrm flipH="1">
-            <a:off x="3162136" y="3570992"/>
-            <a:ext cx="1305561" cy="0"/>
-          </a:xfrm>
-          <a:prstGeom prst="line">
-            <a:avLst/>
-          </a:prstGeom>
-        </p:spPr>
-        <p:style>
-          <a:lnRef idx="1">
-            <a:schemeClr val="accent1"/>
-          </a:lnRef>
-          <a:fillRef idx="0">
-            <a:schemeClr val="accent1"/>
-          </a:fillRef>
-          <a:effectRef idx="0">
-            <a:schemeClr val="accent1"/>
-          </a:effectRef>
-          <a:fontRef idx="minor">
-            <a:schemeClr val="tx1"/>
-          </a:fontRef>
-        </p:style>
-      </p:cxnSp>
-      <p:sp>
-        <p:nvSpPr>
-          <p:cNvPr id="27" name="Arc 26">
-            <a:extLst>
-              <a:ext uri="{FF2B5EF4-FFF2-40B4-BE49-F238E27FC236}">
-                <a16:creationId xmlns:a16="http://schemas.microsoft.com/office/drawing/2014/main" id="{82CC135D-0AFE-1245-82AF-7E1D9B3E20EA}"/>
+                <a16:creationId xmlns:a16="http://schemas.microsoft.com/office/drawing/2014/main" id="{3DA3B260-4F2F-5E4C-BA78-6F5268725A00}"/>
               </a:ext>
             </a:extLst>
           </p:cNvPr>
@@ -18530,60 +18492,7 @@
         </p:nvSpPr>
         <p:spPr>
           <a:xfrm>
-            <a:off x="3871717" y="2975012"/>
-            <a:ext cx="1191961" cy="1191961"/>
-          </a:xfrm>
-          <a:prstGeom prst="arc">
-            <a:avLst>
-              <a:gd name="adj1" fmla="val 14509995"/>
-              <a:gd name="adj2" fmla="val 16320200"/>
-            </a:avLst>
-          </a:prstGeom>
-          <a:solidFill>
-            <a:schemeClr val="accent5"/>
-          </a:solidFill>
-          <a:ln>
-            <a:noFill/>
-          </a:ln>
-        </p:spPr>
-        <p:style>
-          <a:lnRef idx="1">
-            <a:schemeClr val="accent1"/>
-          </a:lnRef>
-          <a:fillRef idx="0">
-            <a:schemeClr val="accent1"/>
-          </a:fillRef>
-          <a:effectRef idx="0">
-            <a:schemeClr val="accent1"/>
-          </a:effectRef>
-          <a:fontRef idx="minor">
-            <a:schemeClr val="tx1"/>
-          </a:fontRef>
-        </p:style>
-        <p:txBody>
-          <a:bodyPr rtlCol="0" anchor="ctr"/>
-          <a:lstStyle/>
-          <a:p>
-            <a:pPr algn="ctr"/>
-            <a:endParaRPr lang="fr-CA"/>
-          </a:p>
-        </p:txBody>
-      </p:sp>
-      <p:sp>
-        <p:nvSpPr>
-          <p:cNvPr id="25" name="Arc 24">
-            <a:extLst>
-              <a:ext uri="{FF2B5EF4-FFF2-40B4-BE49-F238E27FC236}">
-                <a16:creationId xmlns:a16="http://schemas.microsoft.com/office/drawing/2014/main" id="{1518E5C0-3052-6E47-809D-706131874179}"/>
-              </a:ext>
-            </a:extLst>
-          </p:cNvPr>
-          <p:cNvSpPr/>
-          <p:nvPr/>
-        </p:nvSpPr>
-        <p:spPr>
-          <a:xfrm>
-            <a:off x="3893489" y="2975012"/>
+            <a:off x="7474299" y="2468156"/>
             <a:ext cx="1191961" cy="1191961"/>
           </a:xfrm>
           <a:prstGeom prst="arc">
@@ -18624,10 +18533,10 @@
       </p:sp>
       <p:grpSp>
         <p:nvGrpSpPr>
-          <p:cNvPr id="19" name="Group 18">
+          <p:cNvPr id="3" name="Group 2">
             <a:extLst>
               <a:ext uri="{FF2B5EF4-FFF2-40B4-BE49-F238E27FC236}">
-                <a16:creationId xmlns:a16="http://schemas.microsoft.com/office/drawing/2014/main" id="{242D5516-43B7-764A-BAE4-DA9D709935BF}"/>
+                <a16:creationId xmlns:a16="http://schemas.microsoft.com/office/drawing/2014/main" id="{F3B99FBB-4684-F04A-A757-D4CC7070C7AD}"/>
               </a:ext>
             </a:extLst>
           </p:cNvPr>
@@ -18636,18 +18545,1557 @@
         </p:nvGrpSpPr>
         <p:grpSpPr>
           <a:xfrm>
-            <a:off x="4403242" y="1763486"/>
-            <a:ext cx="2841294" cy="1992172"/>
+            <a:off x="777282" y="1493318"/>
+            <a:ext cx="4082400" cy="3007249"/>
+            <a:chOff x="3162136" y="1184400"/>
+            <a:chExt cx="4082400" cy="3007249"/>
+          </a:xfrm>
+        </p:grpSpPr>
+        <p:sp>
+          <p:nvSpPr>
+            <p:cNvPr id="25" name="Arc 24">
+              <a:extLst>
+                <a:ext uri="{FF2B5EF4-FFF2-40B4-BE49-F238E27FC236}">
+                  <a16:creationId xmlns:a16="http://schemas.microsoft.com/office/drawing/2014/main" id="{1518E5C0-3052-6E47-809D-706131874179}"/>
+                </a:ext>
+              </a:extLst>
+            </p:cNvPr>
+            <p:cNvSpPr/>
+            <p:nvPr/>
+          </p:nvSpPr>
+          <p:spPr>
+            <a:xfrm>
+              <a:off x="3893489" y="2975012"/>
+              <a:ext cx="1191961" cy="1191961"/>
+            </a:xfrm>
+            <a:prstGeom prst="arc">
+              <a:avLst>
+                <a:gd name="adj1" fmla="val 19711774"/>
+                <a:gd name="adj2" fmla="val 0"/>
+              </a:avLst>
+            </a:prstGeom>
+            <a:solidFill>
+              <a:schemeClr val="accent5"/>
+            </a:solidFill>
+            <a:ln>
+              <a:noFill/>
+            </a:ln>
+          </p:spPr>
+          <p:style>
+            <a:lnRef idx="1">
+              <a:schemeClr val="accent1"/>
+            </a:lnRef>
+            <a:fillRef idx="0">
+              <a:schemeClr val="accent1"/>
+            </a:fillRef>
+            <a:effectRef idx="0">
+              <a:schemeClr val="accent1"/>
+            </a:effectRef>
+            <a:fontRef idx="minor">
+              <a:schemeClr val="tx1"/>
+            </a:fontRef>
+          </p:style>
+          <p:txBody>
+            <a:bodyPr rtlCol="0" anchor="ctr"/>
+            <a:lstStyle/>
+            <a:p>
+              <a:pPr algn="ctr"/>
+              <a:endParaRPr lang="fr-CA"/>
+            </a:p>
+          </p:txBody>
+        </p:sp>
+        <p:grpSp>
+          <p:nvGrpSpPr>
+            <p:cNvPr id="20" name="Group 19">
+              <a:extLst>
+                <a:ext uri="{FF2B5EF4-FFF2-40B4-BE49-F238E27FC236}">
+                  <a16:creationId xmlns:a16="http://schemas.microsoft.com/office/drawing/2014/main" id="{11A70ECD-AC8D-E640-B548-F009D1DB0686}"/>
+                </a:ext>
+              </a:extLst>
+            </p:cNvPr>
+            <p:cNvGrpSpPr/>
+            <p:nvPr/>
+          </p:nvGrpSpPr>
+          <p:grpSpPr>
+            <a:xfrm rot="19800000">
+              <a:off x="3808150" y="1184400"/>
+              <a:ext cx="2895709" cy="1970691"/>
+              <a:chOff x="4403242" y="1763486"/>
+              <a:chExt cx="2895709" cy="1970691"/>
+            </a:xfrm>
+          </p:grpSpPr>
+          <p:cxnSp>
+            <p:nvCxnSpPr>
+              <p:cNvPr id="21" name="Straight Arrow Connector 20">
+                <a:extLst>
+                  <a:ext uri="{FF2B5EF4-FFF2-40B4-BE49-F238E27FC236}">
+                    <a16:creationId xmlns:a16="http://schemas.microsoft.com/office/drawing/2014/main" id="{60E64938-A112-7344-B832-6F1A4D148C4A}"/>
+                  </a:ext>
+                </a:extLst>
+              </p:cNvPr>
+              <p:cNvCxnSpPr>
+                <a:cxnSpLocks/>
+              </p:cNvCxnSpPr>
+              <p:nvPr/>
+            </p:nvCxnSpPr>
+            <p:spPr>
+              <a:xfrm>
+                <a:off x="4461461" y="3567999"/>
+                <a:ext cx="1808710" cy="0"/>
+              </a:xfrm>
+              <a:prstGeom prst="straightConnector1">
+                <a:avLst/>
+              </a:prstGeom>
+              <a:ln w="38100">
+                <a:solidFill>
+                  <a:srgbClr val="FF0000"/>
+                </a:solidFill>
+                <a:tailEnd type="triangle"/>
+              </a:ln>
+            </p:spPr>
+            <p:style>
+              <a:lnRef idx="1">
+                <a:schemeClr val="accent1"/>
+              </a:lnRef>
+              <a:fillRef idx="0">
+                <a:schemeClr val="accent1"/>
+              </a:fillRef>
+              <a:effectRef idx="0">
+                <a:schemeClr val="accent1"/>
+              </a:effectRef>
+              <a:fontRef idx="minor">
+                <a:schemeClr val="tx1"/>
+              </a:fontRef>
+            </p:style>
+          </p:cxnSp>
+          <p:cxnSp>
+            <p:nvCxnSpPr>
+              <p:cNvPr id="22" name="Straight Arrow Connector 21">
+                <a:extLst>
+                  <a:ext uri="{FF2B5EF4-FFF2-40B4-BE49-F238E27FC236}">
+                    <a16:creationId xmlns:a16="http://schemas.microsoft.com/office/drawing/2014/main" id="{9B6D9146-A90B-6E40-9E97-96801B4B2ACD}"/>
+                  </a:ext>
+                </a:extLst>
+              </p:cNvPr>
+              <p:cNvCxnSpPr>
+                <a:cxnSpLocks/>
+              </p:cNvCxnSpPr>
+              <p:nvPr/>
+            </p:nvCxnSpPr>
+            <p:spPr>
+              <a:xfrm flipV="1">
+                <a:off x="4461461" y="1763486"/>
+                <a:ext cx="0" cy="1804514"/>
+              </a:xfrm>
+              <a:prstGeom prst="straightConnector1">
+                <a:avLst/>
+              </a:prstGeom>
+              <a:ln w="38100">
+                <a:solidFill>
+                  <a:srgbClr val="00B050"/>
+                </a:solidFill>
+                <a:tailEnd type="triangle"/>
+              </a:ln>
+            </p:spPr>
+            <p:style>
+              <a:lnRef idx="1">
+                <a:schemeClr val="accent1"/>
+              </a:lnRef>
+              <a:fillRef idx="0">
+                <a:schemeClr val="accent1"/>
+              </a:fillRef>
+              <a:effectRef idx="0">
+                <a:schemeClr val="accent1"/>
+              </a:effectRef>
+              <a:fontRef idx="minor">
+                <a:schemeClr val="tx1"/>
+              </a:fontRef>
+            </p:style>
+          </p:cxnSp>
+          <p:sp>
+            <p:nvSpPr>
+              <p:cNvPr id="23" name="Oval 22">
+                <a:extLst>
+                  <a:ext uri="{FF2B5EF4-FFF2-40B4-BE49-F238E27FC236}">
+                    <a16:creationId xmlns:a16="http://schemas.microsoft.com/office/drawing/2014/main" id="{B110AC7B-51BE-BC48-83A9-1D93DCD5F5A0}"/>
+                  </a:ext>
+                </a:extLst>
+              </p:cNvPr>
+              <p:cNvSpPr>
+                <a:spLocks noChangeAspect="1"/>
+              </p:cNvSpPr>
+              <p:nvPr/>
+            </p:nvSpPr>
+            <p:spPr>
+              <a:xfrm>
+                <a:off x="4403242" y="3509994"/>
+                <a:ext cx="108000" cy="108000"/>
+              </a:xfrm>
+              <a:prstGeom prst="ellipse">
+                <a:avLst/>
+              </a:prstGeom>
+              <a:solidFill>
+                <a:schemeClr val="bg1"/>
+              </a:solidFill>
+              <a:ln w="38100">
+                <a:solidFill>
+                  <a:srgbClr val="0000FF"/>
+                </a:solidFill>
+              </a:ln>
+            </p:spPr>
+            <p:style>
+              <a:lnRef idx="2">
+                <a:schemeClr val="accent1">
+                  <a:shade val="50000"/>
+                </a:schemeClr>
+              </a:lnRef>
+              <a:fillRef idx="1">
+                <a:schemeClr val="accent1"/>
+              </a:fillRef>
+              <a:effectRef idx="0">
+                <a:schemeClr val="accent1"/>
+              </a:effectRef>
+              <a:fontRef idx="minor">
+                <a:schemeClr val="lt1"/>
+              </a:fontRef>
+            </p:style>
+            <p:txBody>
+              <a:bodyPr rtlCol="0" anchor="ctr"/>
+              <a:lstStyle/>
+              <a:p>
+                <a:pPr algn="ctr"/>
+                <a:endParaRPr lang="fr-CA" sz="2400" noProof="1"/>
+              </a:p>
+            </p:txBody>
+          </p:sp>
+          <p:sp>
+            <p:nvSpPr>
+              <p:cNvPr id="24" name="TextBox 23">
+                <a:extLst>
+                  <a:ext uri="{FF2B5EF4-FFF2-40B4-BE49-F238E27FC236}">
+                    <a16:creationId xmlns:a16="http://schemas.microsoft.com/office/drawing/2014/main" id="{CD807CCC-D963-5B4E-8863-1AC6FD45D06B}"/>
+                  </a:ext>
+                </a:extLst>
+              </p:cNvPr>
+              <p:cNvSpPr txBox="1"/>
+              <p:nvPr/>
+            </p:nvSpPr>
+            <p:spPr>
+              <a:xfrm>
+                <a:off x="6279120" y="3364845"/>
+                <a:ext cx="1019831" cy="369332"/>
+              </a:xfrm>
+              <a:prstGeom prst="rect">
+                <a:avLst/>
+              </a:prstGeom>
+              <a:noFill/>
+            </p:spPr>
+            <p:txBody>
+              <a:bodyPr wrap="none" rtlCol="0">
+                <a:spAutoFit/>
+              </a:bodyPr>
+              <a:lstStyle/>
+              <a:p>
+                <a:r>
+                  <a:rPr lang="fr-CA" noProof="1"/>
+                  <a:t>humerus</a:t>
+                </a:r>
+              </a:p>
+            </p:txBody>
+          </p:sp>
+        </p:grpSp>
+        <p:cxnSp>
+          <p:nvCxnSpPr>
+            <p:cNvPr id="39" name="Straight Connector 38">
+              <a:extLst>
+                <a:ext uri="{FF2B5EF4-FFF2-40B4-BE49-F238E27FC236}">
+                  <a16:creationId xmlns:a16="http://schemas.microsoft.com/office/drawing/2014/main" id="{EB083664-865A-924C-83EF-DEED28F56977}"/>
+                </a:ext>
+              </a:extLst>
+            </p:cNvPr>
+            <p:cNvCxnSpPr>
+              <a:cxnSpLocks/>
+            </p:cNvCxnSpPr>
+            <p:nvPr/>
+          </p:nvCxnSpPr>
+          <p:spPr>
+            <a:xfrm flipH="1">
+              <a:off x="3162136" y="3570992"/>
+              <a:ext cx="1305561" cy="0"/>
+            </a:xfrm>
+            <a:prstGeom prst="line">
+              <a:avLst/>
+            </a:prstGeom>
+          </p:spPr>
+          <p:style>
+            <a:lnRef idx="1">
+              <a:schemeClr val="accent1"/>
+            </a:lnRef>
+            <a:fillRef idx="0">
+              <a:schemeClr val="accent1"/>
+            </a:fillRef>
+            <a:effectRef idx="0">
+              <a:schemeClr val="accent1"/>
+            </a:effectRef>
+            <a:fontRef idx="minor">
+              <a:schemeClr val="tx1"/>
+            </a:fontRef>
+          </p:style>
+        </p:cxnSp>
+        <p:sp>
+          <p:nvSpPr>
+            <p:cNvPr id="27" name="Arc 26">
+              <a:extLst>
+                <a:ext uri="{FF2B5EF4-FFF2-40B4-BE49-F238E27FC236}">
+                  <a16:creationId xmlns:a16="http://schemas.microsoft.com/office/drawing/2014/main" id="{82CC135D-0AFE-1245-82AF-7E1D9B3E20EA}"/>
+                </a:ext>
+              </a:extLst>
+            </p:cNvPr>
+            <p:cNvSpPr/>
+            <p:nvPr/>
+          </p:nvSpPr>
+          <p:spPr>
+            <a:xfrm>
+              <a:off x="3871717" y="2975012"/>
+              <a:ext cx="1191961" cy="1191961"/>
+            </a:xfrm>
+            <a:prstGeom prst="arc">
+              <a:avLst>
+                <a:gd name="adj1" fmla="val 14509995"/>
+                <a:gd name="adj2" fmla="val 16320200"/>
+              </a:avLst>
+            </a:prstGeom>
+            <a:solidFill>
+              <a:schemeClr val="accent5"/>
+            </a:solidFill>
+            <a:ln>
+              <a:noFill/>
+            </a:ln>
+          </p:spPr>
+          <p:style>
+            <a:lnRef idx="1">
+              <a:schemeClr val="accent1"/>
+            </a:lnRef>
+            <a:fillRef idx="0">
+              <a:schemeClr val="accent1"/>
+            </a:fillRef>
+            <a:effectRef idx="0">
+              <a:schemeClr val="accent1"/>
+            </a:effectRef>
+            <a:fontRef idx="minor">
+              <a:schemeClr val="tx1"/>
+            </a:fontRef>
+          </p:style>
+          <p:txBody>
+            <a:bodyPr rtlCol="0" anchor="ctr"/>
+            <a:lstStyle/>
+            <a:p>
+              <a:pPr algn="ctr"/>
+              <a:endParaRPr lang="fr-CA"/>
+            </a:p>
+          </p:txBody>
+        </p:sp>
+        <p:grpSp>
+          <p:nvGrpSpPr>
+            <p:cNvPr id="19" name="Group 18">
+              <a:extLst>
+                <a:ext uri="{FF2B5EF4-FFF2-40B4-BE49-F238E27FC236}">
+                  <a16:creationId xmlns:a16="http://schemas.microsoft.com/office/drawing/2014/main" id="{242D5516-43B7-764A-BAE4-DA9D709935BF}"/>
+                </a:ext>
+              </a:extLst>
+            </p:cNvPr>
+            <p:cNvGrpSpPr/>
+            <p:nvPr/>
+          </p:nvGrpSpPr>
+          <p:grpSpPr>
+            <a:xfrm>
+              <a:off x="4403242" y="1763486"/>
+              <a:ext cx="2841294" cy="1992172"/>
+              <a:chOff x="4403242" y="1763486"/>
+              <a:chExt cx="2841294" cy="1992172"/>
+            </a:xfrm>
+          </p:grpSpPr>
+          <p:cxnSp>
+            <p:nvCxnSpPr>
+              <p:cNvPr id="5" name="Straight Arrow Connector 4">
+                <a:extLst>
+                  <a:ext uri="{FF2B5EF4-FFF2-40B4-BE49-F238E27FC236}">
+                    <a16:creationId xmlns:a16="http://schemas.microsoft.com/office/drawing/2014/main" id="{E4C27EC6-B759-914C-A0F0-1E2A2FB7DAA1}"/>
+                  </a:ext>
+                </a:extLst>
+              </p:cNvPr>
+              <p:cNvCxnSpPr>
+                <a:cxnSpLocks/>
+              </p:cNvCxnSpPr>
+              <p:nvPr/>
+            </p:nvCxnSpPr>
+            <p:spPr>
+              <a:xfrm>
+                <a:off x="4461461" y="3567999"/>
+                <a:ext cx="1808710" cy="0"/>
+              </a:xfrm>
+              <a:prstGeom prst="straightConnector1">
+                <a:avLst/>
+              </a:prstGeom>
+              <a:ln w="12700">
+                <a:solidFill>
+                  <a:srgbClr val="FF0000"/>
+                </a:solidFill>
+                <a:tailEnd type="triangle"/>
+              </a:ln>
+            </p:spPr>
+            <p:style>
+              <a:lnRef idx="1">
+                <a:schemeClr val="accent1"/>
+              </a:lnRef>
+              <a:fillRef idx="0">
+                <a:schemeClr val="accent1"/>
+              </a:fillRef>
+              <a:effectRef idx="0">
+                <a:schemeClr val="accent1"/>
+              </a:effectRef>
+              <a:fontRef idx="minor">
+                <a:schemeClr val="tx1"/>
+              </a:fontRef>
+            </p:style>
+          </p:cxnSp>
+          <p:cxnSp>
+            <p:nvCxnSpPr>
+              <p:cNvPr id="6" name="Straight Arrow Connector 5">
+                <a:extLst>
+                  <a:ext uri="{FF2B5EF4-FFF2-40B4-BE49-F238E27FC236}">
+                    <a16:creationId xmlns:a16="http://schemas.microsoft.com/office/drawing/2014/main" id="{F204628A-117F-084C-AAC5-8779B2BB0C2D}"/>
+                  </a:ext>
+                </a:extLst>
+              </p:cNvPr>
+              <p:cNvCxnSpPr>
+                <a:cxnSpLocks/>
+              </p:cNvCxnSpPr>
+              <p:nvPr/>
+            </p:nvCxnSpPr>
+            <p:spPr>
+              <a:xfrm flipV="1">
+                <a:off x="4461461" y="1763486"/>
+                <a:ext cx="0" cy="1804514"/>
+              </a:xfrm>
+              <a:prstGeom prst="straightConnector1">
+                <a:avLst/>
+              </a:prstGeom>
+              <a:ln w="12700">
+                <a:solidFill>
+                  <a:srgbClr val="00B050"/>
+                </a:solidFill>
+                <a:tailEnd type="triangle"/>
+              </a:ln>
+            </p:spPr>
+            <p:style>
+              <a:lnRef idx="1">
+                <a:schemeClr val="accent1"/>
+              </a:lnRef>
+              <a:fillRef idx="0">
+                <a:schemeClr val="accent1"/>
+              </a:fillRef>
+              <a:effectRef idx="0">
+                <a:schemeClr val="accent1"/>
+              </a:effectRef>
+              <a:fontRef idx="minor">
+                <a:schemeClr val="tx1"/>
+              </a:fontRef>
+            </p:style>
+          </p:cxnSp>
+          <p:sp>
+            <p:nvSpPr>
+              <p:cNvPr id="7" name="Oval 6">
+                <a:extLst>
+                  <a:ext uri="{FF2B5EF4-FFF2-40B4-BE49-F238E27FC236}">
+                    <a16:creationId xmlns:a16="http://schemas.microsoft.com/office/drawing/2014/main" id="{DEC91F2C-436E-2144-BF37-33604A63D8BA}"/>
+                  </a:ext>
+                </a:extLst>
+              </p:cNvPr>
+              <p:cNvSpPr>
+                <a:spLocks noChangeAspect="1"/>
+              </p:cNvSpPr>
+              <p:nvPr/>
+            </p:nvSpPr>
+            <p:spPr>
+              <a:xfrm>
+                <a:off x="4403242" y="3509994"/>
+                <a:ext cx="108000" cy="108000"/>
+              </a:xfrm>
+              <a:prstGeom prst="ellipse">
+                <a:avLst/>
+              </a:prstGeom>
+              <a:solidFill>
+                <a:schemeClr val="bg1"/>
+              </a:solidFill>
+              <a:ln w="38100">
+                <a:solidFill>
+                  <a:srgbClr val="0000FF"/>
+                </a:solidFill>
+              </a:ln>
+            </p:spPr>
+            <p:style>
+              <a:lnRef idx="2">
+                <a:schemeClr val="accent1">
+                  <a:shade val="50000"/>
+                </a:schemeClr>
+              </a:lnRef>
+              <a:fillRef idx="1">
+                <a:schemeClr val="accent1"/>
+              </a:fillRef>
+              <a:effectRef idx="0">
+                <a:schemeClr val="accent1"/>
+              </a:effectRef>
+              <a:fontRef idx="minor">
+                <a:schemeClr val="lt1"/>
+              </a:fontRef>
+            </p:style>
+            <p:txBody>
+              <a:bodyPr rtlCol="0" anchor="ctr"/>
+              <a:lstStyle/>
+              <a:p>
+                <a:pPr algn="ctr"/>
+                <a:endParaRPr lang="fr-CA" sz="2400" noProof="1"/>
+              </a:p>
+            </p:txBody>
+          </p:sp>
+          <p:sp>
+            <p:nvSpPr>
+              <p:cNvPr id="4" name="TextBox 3">
+                <a:extLst>
+                  <a:ext uri="{FF2B5EF4-FFF2-40B4-BE49-F238E27FC236}">
+                    <a16:creationId xmlns:a16="http://schemas.microsoft.com/office/drawing/2014/main" id="{7052713B-C885-4348-B849-679E993CE69B}"/>
+                  </a:ext>
+                </a:extLst>
+              </p:cNvPr>
+              <p:cNvSpPr txBox="1"/>
+              <p:nvPr/>
+            </p:nvSpPr>
+            <p:spPr>
+              <a:xfrm>
+                <a:off x="6490804" y="3386326"/>
+                <a:ext cx="753732" cy="369332"/>
+              </a:xfrm>
+              <a:prstGeom prst="rect">
+                <a:avLst/>
+              </a:prstGeom>
+              <a:noFill/>
+            </p:spPr>
+            <p:txBody>
+              <a:bodyPr wrap="none" rtlCol="0">
+                <a:spAutoFit/>
+              </a:bodyPr>
+              <a:lstStyle/>
+              <a:p>
+                <a:r>
+                  <a:rPr lang="fr-CA" noProof="1"/>
+                  <a:t>global</a:t>
+                </a:r>
+              </a:p>
+            </p:txBody>
+          </p:sp>
+        </p:grpSp>
+        <mc:AlternateContent xmlns:mc="http://schemas.openxmlformats.org/markup-compatibility/2006">
+          <mc:Choice xmlns:a14="http://schemas.microsoft.com/office/drawing/2010/main" Requires="a14">
+            <p:sp>
+              <p:nvSpPr>
+                <p:cNvPr id="26" name="TextBox 25">
+                  <a:extLst>
+                    <a:ext uri="{FF2B5EF4-FFF2-40B4-BE49-F238E27FC236}">
+                      <a16:creationId xmlns:a16="http://schemas.microsoft.com/office/drawing/2014/main" id="{9FDAA357-AF61-004C-AF14-808D8AB75A1E}"/>
+                    </a:ext>
+                  </a:extLst>
+                </p:cNvPr>
+                <p:cNvSpPr txBox="1"/>
+                <p:nvPr/>
+              </p:nvSpPr>
+              <p:spPr>
+                <a:xfrm>
+                  <a:off x="4734415" y="3242006"/>
+                  <a:ext cx="374140" cy="369332"/>
+                </a:xfrm>
+                <a:prstGeom prst="rect">
+                  <a:avLst/>
+                </a:prstGeom>
+                <a:noFill/>
+              </p:spPr>
+              <p:txBody>
+                <a:bodyPr wrap="none" rtlCol="0">
+                  <a:spAutoFit/>
+                </a:bodyPr>
+                <a:lstStyle/>
+                <a:p>
+                  <a:pPr/>
+                  <a14:m>
+                    <m:oMathPara xmlns:m="http://schemas.openxmlformats.org/officeDocument/2006/math">
+                      <m:oMathParaPr>
+                        <m:jc m:val="centerGroup"/>
+                      </m:oMathParaPr>
+                      <m:oMath xmlns:m="http://schemas.openxmlformats.org/officeDocument/2006/math">
+                        <m:r>
+                          <a:rPr lang="fr-FR" b="0" i="1" noProof="1" smtClean="0">
+                            <a:latin typeface="Cambria Math" panose="02040503050406030204" pitchFamily="18" charset="0"/>
+                          </a:rPr>
+                          <m:t>𝜃</m:t>
+                        </m:r>
+                      </m:oMath>
+                    </m:oMathPara>
+                  </a14:m>
+                  <a:endParaRPr lang="fr-CA" noProof="1"/>
+                </a:p>
+              </p:txBody>
+            </p:sp>
+          </mc:Choice>
+          <mc:Fallback>
+            <p:sp>
+              <p:nvSpPr>
+                <p:cNvPr id="26" name="TextBox 25">
+                  <a:extLst>
+                    <a:ext uri="{FF2B5EF4-FFF2-40B4-BE49-F238E27FC236}">
+                      <a16:creationId xmlns:a16="http://schemas.microsoft.com/office/drawing/2014/main" id="{9FDAA357-AF61-004C-AF14-808D8AB75A1E}"/>
+                    </a:ext>
+                  </a:extLst>
+                </p:cNvPr>
+                <p:cNvSpPr txBox="1">
+                  <a:spLocks noRot="1" noChangeAspect="1" noMove="1" noResize="1" noEditPoints="1" noAdjustHandles="1" noChangeArrowheads="1" noChangeShapeType="1" noTextEdit="1"/>
+                </p:cNvSpPr>
+                <p:nvPr/>
+              </p:nvSpPr>
+              <p:spPr>
+                <a:xfrm>
+                  <a:off x="4734415" y="3242006"/>
+                  <a:ext cx="374140" cy="369332"/>
+                </a:xfrm>
+                <a:prstGeom prst="rect">
+                  <a:avLst/>
+                </a:prstGeom>
+                <a:blipFill>
+                  <a:blip r:embed="rId2"/>
+                  <a:stretch>
+                    <a:fillRect/>
+                  </a:stretch>
+                </a:blipFill>
+              </p:spPr>
+              <p:txBody>
+                <a:bodyPr/>
+                <a:lstStyle/>
+                <a:p>
+                  <a:r>
+                    <a:rPr lang="fr-CA">
+                      <a:noFill/>
+                    </a:rPr>
+                    <a:t> </a:t>
+                  </a:r>
+                </a:p>
+              </p:txBody>
+            </p:sp>
+          </mc:Fallback>
+        </mc:AlternateContent>
+        <mc:AlternateContent xmlns:mc="http://schemas.openxmlformats.org/markup-compatibility/2006">
+          <mc:Choice xmlns:a14="http://schemas.microsoft.com/office/drawing/2010/main" Requires="a14">
+            <p:sp>
+              <p:nvSpPr>
+                <p:cNvPr id="28" name="TextBox 27">
+                  <a:extLst>
+                    <a:ext uri="{FF2B5EF4-FFF2-40B4-BE49-F238E27FC236}">
+                      <a16:creationId xmlns:a16="http://schemas.microsoft.com/office/drawing/2014/main" id="{847031B9-2193-5B4D-A965-5D5BC00F57AF}"/>
+                    </a:ext>
+                  </a:extLst>
+                </p:cNvPr>
+                <p:cNvSpPr txBox="1"/>
+                <p:nvPr/>
+              </p:nvSpPr>
+              <p:spPr>
+                <a:xfrm>
+                  <a:off x="4167155" y="2979431"/>
+                  <a:ext cx="374140" cy="369332"/>
+                </a:xfrm>
+                <a:prstGeom prst="rect">
+                  <a:avLst/>
+                </a:prstGeom>
+                <a:noFill/>
+              </p:spPr>
+              <p:txBody>
+                <a:bodyPr wrap="none" rtlCol="0">
+                  <a:spAutoFit/>
+                </a:bodyPr>
+                <a:lstStyle/>
+                <a:p>
+                  <a:pPr/>
+                  <a14:m>
+                    <m:oMathPara xmlns:m="http://schemas.openxmlformats.org/officeDocument/2006/math">
+                      <m:oMathParaPr>
+                        <m:jc m:val="centerGroup"/>
+                      </m:oMathParaPr>
+                      <m:oMath xmlns:m="http://schemas.openxmlformats.org/officeDocument/2006/math">
+                        <m:r>
+                          <a:rPr lang="fr-FR" b="0" i="1" noProof="1" smtClean="0">
+                            <a:latin typeface="Cambria Math" panose="02040503050406030204" pitchFamily="18" charset="0"/>
+                          </a:rPr>
+                          <m:t>𝜃</m:t>
+                        </m:r>
+                      </m:oMath>
+                    </m:oMathPara>
+                  </a14:m>
+                  <a:endParaRPr lang="fr-CA" noProof="1"/>
+                </a:p>
+              </p:txBody>
+            </p:sp>
+          </mc:Choice>
+          <mc:Fallback>
+            <p:sp>
+              <p:nvSpPr>
+                <p:cNvPr id="28" name="TextBox 27">
+                  <a:extLst>
+                    <a:ext uri="{FF2B5EF4-FFF2-40B4-BE49-F238E27FC236}">
+                      <a16:creationId xmlns:a16="http://schemas.microsoft.com/office/drawing/2014/main" id="{847031B9-2193-5B4D-A965-5D5BC00F57AF}"/>
+                    </a:ext>
+                  </a:extLst>
+                </p:cNvPr>
+                <p:cNvSpPr txBox="1">
+                  <a:spLocks noRot="1" noChangeAspect="1" noMove="1" noResize="1" noEditPoints="1" noAdjustHandles="1" noChangeArrowheads="1" noChangeShapeType="1" noTextEdit="1"/>
+                </p:cNvSpPr>
+                <p:nvPr/>
+              </p:nvSpPr>
+              <p:spPr>
+                <a:xfrm>
+                  <a:off x="4167155" y="2979431"/>
+                  <a:ext cx="374140" cy="369332"/>
+                </a:xfrm>
+                <a:prstGeom prst="rect">
+                  <a:avLst/>
+                </a:prstGeom>
+                <a:blipFill>
+                  <a:blip r:embed="rId3"/>
+                  <a:stretch>
+                    <a:fillRect/>
+                  </a:stretch>
+                </a:blipFill>
+              </p:spPr>
+              <p:txBody>
+                <a:bodyPr/>
+                <a:lstStyle/>
+                <a:p>
+                  <a:r>
+                    <a:rPr lang="fr-CA">
+                      <a:noFill/>
+                    </a:rPr>
+                    <a:t> </a:t>
+                  </a:r>
+                </a:p>
+              </p:txBody>
+            </p:sp>
+          </mc:Fallback>
+        </mc:AlternateContent>
+        <p:cxnSp>
+          <p:nvCxnSpPr>
+            <p:cNvPr id="30" name="Straight Connector 29">
+              <a:extLst>
+                <a:ext uri="{FF2B5EF4-FFF2-40B4-BE49-F238E27FC236}">
+                  <a16:creationId xmlns:a16="http://schemas.microsoft.com/office/drawing/2014/main" id="{D0E64ADD-00BA-064E-A6C7-E639E8CB2A06}"/>
+                </a:ext>
+              </a:extLst>
+            </p:cNvPr>
+            <p:cNvCxnSpPr>
+              <a:cxnSpLocks/>
+            </p:cNvCxnSpPr>
+            <p:nvPr/>
+          </p:nvCxnSpPr>
+          <p:spPr>
+            <a:xfrm>
+              <a:off x="6006747" y="2732867"/>
+              <a:ext cx="0" cy="838125"/>
+            </a:xfrm>
+            <a:prstGeom prst="line">
+              <a:avLst/>
+            </a:prstGeom>
+          </p:spPr>
+          <p:style>
+            <a:lnRef idx="1">
+              <a:schemeClr val="accent1"/>
+            </a:lnRef>
+            <a:fillRef idx="0">
+              <a:schemeClr val="accent1"/>
+            </a:fillRef>
+            <a:effectRef idx="0">
+              <a:schemeClr val="accent1"/>
+            </a:effectRef>
+            <a:fontRef idx="minor">
+              <a:schemeClr val="tx1"/>
+            </a:fontRef>
+          </p:style>
+        </p:cxnSp>
+        <p:cxnSp>
+          <p:nvCxnSpPr>
+            <p:cNvPr id="31" name="Straight Connector 30">
+              <a:extLst>
+                <a:ext uri="{FF2B5EF4-FFF2-40B4-BE49-F238E27FC236}">
+                  <a16:creationId xmlns:a16="http://schemas.microsoft.com/office/drawing/2014/main" id="{1296E27F-C381-C64D-B10D-0A028C7A2928}"/>
+                </a:ext>
+              </a:extLst>
+            </p:cNvPr>
+            <p:cNvCxnSpPr>
+              <a:cxnSpLocks/>
+            </p:cNvCxnSpPr>
+            <p:nvPr/>
+          </p:nvCxnSpPr>
+          <p:spPr>
+            <a:xfrm flipH="1">
+              <a:off x="4489469" y="2676629"/>
+              <a:ext cx="1380665" cy="0"/>
+            </a:xfrm>
+            <a:prstGeom prst="line">
+              <a:avLst/>
+            </a:prstGeom>
+          </p:spPr>
+          <p:style>
+            <a:lnRef idx="1">
+              <a:schemeClr val="accent1"/>
+            </a:lnRef>
+            <a:fillRef idx="0">
+              <a:schemeClr val="accent1"/>
+            </a:fillRef>
+            <a:effectRef idx="0">
+              <a:schemeClr val="accent1"/>
+            </a:effectRef>
+            <a:fontRef idx="minor">
+              <a:schemeClr val="tx1"/>
+            </a:fontRef>
+          </p:style>
+        </p:cxnSp>
+        <p:cxnSp>
+          <p:nvCxnSpPr>
+            <p:cNvPr id="35" name="Straight Connector 34">
+              <a:extLst>
+                <a:ext uri="{FF2B5EF4-FFF2-40B4-BE49-F238E27FC236}">
+                  <a16:creationId xmlns:a16="http://schemas.microsoft.com/office/drawing/2014/main" id="{D3B85616-3708-C344-81E9-7CF479361439}"/>
+                </a:ext>
+              </a:extLst>
+            </p:cNvPr>
+            <p:cNvCxnSpPr>
+              <a:cxnSpLocks/>
+            </p:cNvCxnSpPr>
+            <p:nvPr/>
+          </p:nvCxnSpPr>
+          <p:spPr>
+            <a:xfrm flipH="1">
+              <a:off x="3571473" y="2011959"/>
+              <a:ext cx="896224" cy="0"/>
+            </a:xfrm>
+            <a:prstGeom prst="line">
+              <a:avLst/>
+            </a:prstGeom>
+          </p:spPr>
+          <p:style>
+            <a:lnRef idx="1">
+              <a:schemeClr val="accent1"/>
+            </a:lnRef>
+            <a:fillRef idx="0">
+              <a:schemeClr val="accent1"/>
+            </a:fillRef>
+            <a:effectRef idx="0">
+              <a:schemeClr val="accent1"/>
+            </a:effectRef>
+            <a:fontRef idx="minor">
+              <a:schemeClr val="tx1"/>
+            </a:fontRef>
+          </p:style>
+        </p:cxnSp>
+        <p:cxnSp>
+          <p:nvCxnSpPr>
+            <p:cNvPr id="37" name="Straight Connector 36">
+              <a:extLst>
+                <a:ext uri="{FF2B5EF4-FFF2-40B4-BE49-F238E27FC236}">
+                  <a16:creationId xmlns:a16="http://schemas.microsoft.com/office/drawing/2014/main" id="{0B80EF5C-B664-B548-B664-E1D7EC0A6D01}"/>
+                </a:ext>
+              </a:extLst>
+            </p:cNvPr>
+            <p:cNvCxnSpPr>
+              <a:cxnSpLocks/>
+            </p:cNvCxnSpPr>
+            <p:nvPr/>
+          </p:nvCxnSpPr>
+          <p:spPr>
+            <a:xfrm>
+              <a:off x="3557705" y="2057280"/>
+              <a:ext cx="11801" cy="1513748"/>
+            </a:xfrm>
+            <a:prstGeom prst="line">
+              <a:avLst/>
+            </a:prstGeom>
+          </p:spPr>
+          <p:style>
+            <a:lnRef idx="1">
+              <a:schemeClr val="accent1"/>
+            </a:lnRef>
+            <a:fillRef idx="0">
+              <a:schemeClr val="accent1"/>
+            </a:fillRef>
+            <a:effectRef idx="0">
+              <a:schemeClr val="accent1"/>
+            </a:effectRef>
+            <a:fontRef idx="minor">
+              <a:schemeClr val="tx1"/>
+            </a:fontRef>
+          </p:style>
+        </p:cxnSp>
+        <mc:AlternateContent xmlns:mc="http://schemas.openxmlformats.org/markup-compatibility/2006">
+          <mc:Choice xmlns:a14="http://schemas.microsoft.com/office/drawing/2010/main" Requires="a14">
+            <p:sp>
+              <p:nvSpPr>
+                <p:cNvPr id="42" name="TextBox 41">
+                  <a:extLst>
+                    <a:ext uri="{FF2B5EF4-FFF2-40B4-BE49-F238E27FC236}">
+                      <a16:creationId xmlns:a16="http://schemas.microsoft.com/office/drawing/2014/main" id="{0BDBCBFB-2348-3047-9BD0-F7589E4E44F6}"/>
+                    </a:ext>
+                  </a:extLst>
+                </p:cNvPr>
+                <p:cNvSpPr txBox="1"/>
+                <p:nvPr/>
+              </p:nvSpPr>
+              <p:spPr>
+                <a:xfrm rot="16200000">
+                  <a:off x="5699375" y="3680073"/>
+                  <a:ext cx="618374" cy="261610"/>
+                </a:xfrm>
+                <a:prstGeom prst="rect">
+                  <a:avLst/>
+                </a:prstGeom>
+                <a:noFill/>
+              </p:spPr>
+              <p:txBody>
+                <a:bodyPr wrap="none" rtlCol="0">
+                  <a:spAutoFit/>
+                </a:bodyPr>
+                <a:lstStyle/>
+                <a:p>
+                  <a:pPr/>
+                  <a14:m>
+                    <m:oMathPara xmlns:m="http://schemas.openxmlformats.org/officeDocument/2006/math">
+                      <m:oMathParaPr>
+                        <m:jc m:val="centerGroup"/>
+                      </m:oMathParaPr>
+                      <m:oMath xmlns:m="http://schemas.openxmlformats.org/officeDocument/2006/math">
+                        <m:r>
+                          <m:rPr>
+                            <m:sty m:val="p"/>
+                          </m:rPr>
+                          <a:rPr lang="fr-FR" sz="1100" b="0" i="0" smtClean="0">
+                            <a:latin typeface="Cambria Math" panose="02040503050406030204" pitchFamily="18" charset="0"/>
+                          </a:rPr>
+                          <m:t>cos</m:t>
+                        </m:r>
+                        <m:r>
+                          <a:rPr lang="fr-FR" sz="1100" b="0" i="1" smtClean="0">
+                            <a:latin typeface="Cambria Math" panose="02040503050406030204" pitchFamily="18" charset="0"/>
+                          </a:rPr>
+                          <m:t>⁡(</m:t>
+                        </m:r>
+                        <m:r>
+                          <a:rPr lang="fr-FR" sz="1100" b="0" i="1" smtClean="0">
+                            <a:latin typeface="Cambria Math" panose="02040503050406030204" pitchFamily="18" charset="0"/>
+                          </a:rPr>
+                          <m:t>𝜃</m:t>
+                        </m:r>
+                        <m:r>
+                          <a:rPr lang="fr-FR" sz="1100" b="0" i="1" smtClean="0">
+                            <a:latin typeface="Cambria Math" panose="02040503050406030204" pitchFamily="18" charset="0"/>
+                          </a:rPr>
+                          <m:t>)</m:t>
+                        </m:r>
+                      </m:oMath>
+                    </m:oMathPara>
+                  </a14:m>
+                  <a:endParaRPr lang="fr-CA" sz="1100" dirty="0"/>
+                </a:p>
+              </p:txBody>
+            </p:sp>
+          </mc:Choice>
+          <mc:Fallback>
+            <p:sp>
+              <p:nvSpPr>
+                <p:cNvPr id="42" name="TextBox 41">
+                  <a:extLst>
+                    <a:ext uri="{FF2B5EF4-FFF2-40B4-BE49-F238E27FC236}">
+                      <a16:creationId xmlns:a16="http://schemas.microsoft.com/office/drawing/2014/main" id="{0BDBCBFB-2348-3047-9BD0-F7589E4E44F6}"/>
+                    </a:ext>
+                  </a:extLst>
+                </p:cNvPr>
+                <p:cNvSpPr txBox="1">
+                  <a:spLocks noRot="1" noChangeAspect="1" noMove="1" noResize="1" noEditPoints="1" noAdjustHandles="1" noChangeArrowheads="1" noChangeShapeType="1" noTextEdit="1"/>
+                </p:cNvSpPr>
+                <p:nvPr/>
+              </p:nvSpPr>
+              <p:spPr>
+                <a:xfrm rot="16200000">
+                  <a:off x="5699375" y="3680073"/>
+                  <a:ext cx="618374" cy="261610"/>
+                </a:xfrm>
+                <a:prstGeom prst="rect">
+                  <a:avLst/>
+                </a:prstGeom>
+                <a:blipFill>
+                  <a:blip r:embed="rId4"/>
+                  <a:stretch>
+                    <a:fillRect r="-4762"/>
+                  </a:stretch>
+                </a:blipFill>
+              </p:spPr>
+              <p:txBody>
+                <a:bodyPr/>
+                <a:lstStyle/>
+                <a:p>
+                  <a:r>
+                    <a:rPr lang="fr-CA">
+                      <a:noFill/>
+                    </a:rPr>
+                    <a:t> </a:t>
+                  </a:r>
+                </a:p>
+              </p:txBody>
+            </p:sp>
+          </mc:Fallback>
+        </mc:AlternateContent>
+        <mc:AlternateContent xmlns:mc="http://schemas.openxmlformats.org/markup-compatibility/2006">
+          <mc:Choice xmlns:a14="http://schemas.microsoft.com/office/drawing/2010/main" Requires="a14">
+            <p:sp>
+              <p:nvSpPr>
+                <p:cNvPr id="43" name="TextBox 42">
+                  <a:extLst>
+                    <a:ext uri="{FF2B5EF4-FFF2-40B4-BE49-F238E27FC236}">
+                      <a16:creationId xmlns:a16="http://schemas.microsoft.com/office/drawing/2014/main" id="{107CC927-2752-1A48-B00C-458D93592B67}"/>
+                    </a:ext>
+                  </a:extLst>
+                </p:cNvPr>
+                <p:cNvSpPr txBox="1"/>
+                <p:nvPr/>
+              </p:nvSpPr>
+              <p:spPr>
+                <a:xfrm>
+                  <a:off x="3943759" y="2543956"/>
+                  <a:ext cx="597536" cy="261610"/>
+                </a:xfrm>
+                <a:prstGeom prst="rect">
+                  <a:avLst/>
+                </a:prstGeom>
+                <a:noFill/>
+              </p:spPr>
+              <p:txBody>
+                <a:bodyPr wrap="none" rtlCol="0">
+                  <a:spAutoFit/>
+                </a:bodyPr>
+                <a:lstStyle/>
+                <a:p>
+                  <a:pPr/>
+                  <a14:m>
+                    <m:oMathPara xmlns:m="http://schemas.openxmlformats.org/officeDocument/2006/math">
+                      <m:oMathParaPr>
+                        <m:jc m:val="centerGroup"/>
+                      </m:oMathParaPr>
+                      <m:oMath xmlns:m="http://schemas.openxmlformats.org/officeDocument/2006/math">
+                        <m:r>
+                          <m:rPr>
+                            <m:sty m:val="p"/>
+                          </m:rPr>
+                          <a:rPr lang="fr-FR" sz="1100" b="0" i="0" smtClean="0">
+                            <a:latin typeface="Cambria Math" panose="02040503050406030204" pitchFamily="18" charset="0"/>
+                          </a:rPr>
+                          <m:t>sin</m:t>
+                        </m:r>
+                        <m:r>
+                          <a:rPr lang="fr-FR" sz="1100" b="0" i="1" smtClean="0">
+                            <a:latin typeface="Cambria Math" panose="02040503050406030204" pitchFamily="18" charset="0"/>
+                          </a:rPr>
+                          <m:t>⁡(</m:t>
+                        </m:r>
+                        <m:r>
+                          <a:rPr lang="fr-FR" sz="1100" b="0" i="1" smtClean="0">
+                            <a:latin typeface="Cambria Math" panose="02040503050406030204" pitchFamily="18" charset="0"/>
+                          </a:rPr>
+                          <m:t>𝜃</m:t>
+                        </m:r>
+                        <m:r>
+                          <a:rPr lang="fr-FR" sz="1100" b="0" i="1" smtClean="0">
+                            <a:latin typeface="Cambria Math" panose="02040503050406030204" pitchFamily="18" charset="0"/>
+                          </a:rPr>
+                          <m:t>)</m:t>
+                        </m:r>
+                      </m:oMath>
+                    </m:oMathPara>
+                  </a14:m>
+                  <a:endParaRPr lang="fr-CA" sz="1100" dirty="0"/>
+                </a:p>
+              </p:txBody>
+            </p:sp>
+          </mc:Choice>
+          <mc:Fallback>
+            <p:sp>
+              <p:nvSpPr>
+                <p:cNvPr id="43" name="TextBox 42">
+                  <a:extLst>
+                    <a:ext uri="{FF2B5EF4-FFF2-40B4-BE49-F238E27FC236}">
+                      <a16:creationId xmlns:a16="http://schemas.microsoft.com/office/drawing/2014/main" id="{107CC927-2752-1A48-B00C-458D93592B67}"/>
+                    </a:ext>
+                  </a:extLst>
+                </p:cNvPr>
+                <p:cNvSpPr txBox="1">
+                  <a:spLocks noRot="1" noChangeAspect="1" noMove="1" noResize="1" noEditPoints="1" noAdjustHandles="1" noChangeArrowheads="1" noChangeShapeType="1" noTextEdit="1"/>
+                </p:cNvSpPr>
+                <p:nvPr/>
+              </p:nvSpPr>
+              <p:spPr>
+                <a:xfrm>
+                  <a:off x="3943759" y="2543956"/>
+                  <a:ext cx="597536" cy="261610"/>
+                </a:xfrm>
+                <a:prstGeom prst="rect">
+                  <a:avLst/>
+                </a:prstGeom>
+                <a:blipFill>
+                  <a:blip r:embed="rId5"/>
+                  <a:stretch>
+                    <a:fillRect b="-4545"/>
+                  </a:stretch>
+                </a:blipFill>
+              </p:spPr>
+              <p:txBody>
+                <a:bodyPr/>
+                <a:lstStyle/>
+                <a:p>
+                  <a:r>
+                    <a:rPr lang="fr-CA">
+                      <a:noFill/>
+                    </a:rPr>
+                    <a:t> </a:t>
+                  </a:r>
+                </a:p>
+              </p:txBody>
+            </p:sp>
+          </mc:Fallback>
+        </mc:AlternateContent>
+        <p:sp>
+          <p:nvSpPr>
+            <p:cNvPr id="44" name="TextBox 43">
+              <a:extLst>
+                <a:ext uri="{FF2B5EF4-FFF2-40B4-BE49-F238E27FC236}">
+                  <a16:creationId xmlns:a16="http://schemas.microsoft.com/office/drawing/2014/main" id="{B3096E3D-C2F5-C64C-9BBC-C162798DF26C}"/>
+                </a:ext>
+              </a:extLst>
+            </p:cNvPr>
+            <p:cNvSpPr txBox="1"/>
+            <p:nvPr/>
+          </p:nvSpPr>
+          <p:spPr>
+            <a:xfrm>
+              <a:off x="6273637" y="3379328"/>
+              <a:ext cx="284052" cy="369332"/>
+            </a:xfrm>
+            <a:prstGeom prst="rect">
+              <a:avLst/>
+            </a:prstGeom>
+            <a:noFill/>
+          </p:spPr>
+          <p:txBody>
+            <a:bodyPr wrap="none" rtlCol="0">
+              <a:spAutoFit/>
+            </a:bodyPr>
+            <a:lstStyle/>
+            <a:p>
+              <a:r>
+                <a:rPr lang="fr-CA" noProof="1">
+                  <a:solidFill>
+                    <a:srgbClr val="FF0000"/>
+                  </a:solidFill>
+                </a:rPr>
+                <a:t>x</a:t>
+              </a:r>
+            </a:p>
+          </p:txBody>
+        </p:sp>
+        <p:sp>
+          <p:nvSpPr>
+            <p:cNvPr id="45" name="TextBox 44">
+              <a:extLst>
+                <a:ext uri="{FF2B5EF4-FFF2-40B4-BE49-F238E27FC236}">
+                  <a16:creationId xmlns:a16="http://schemas.microsoft.com/office/drawing/2014/main" id="{8D615CE7-445E-EB41-B4A6-9ACE65DF7F1B}"/>
+                </a:ext>
+              </a:extLst>
+            </p:cNvPr>
+            <p:cNvSpPr txBox="1"/>
+            <p:nvPr/>
+          </p:nvSpPr>
+          <p:spPr>
+            <a:xfrm>
+              <a:off x="4323266" y="1372507"/>
+              <a:ext cx="288862" cy="369332"/>
+            </a:xfrm>
+            <a:prstGeom prst="rect">
+              <a:avLst/>
+            </a:prstGeom>
+            <a:noFill/>
+          </p:spPr>
+          <p:txBody>
+            <a:bodyPr wrap="none" rtlCol="0">
+              <a:spAutoFit/>
+            </a:bodyPr>
+            <a:lstStyle/>
+            <a:p>
+              <a:r>
+                <a:rPr lang="fr-CA" noProof="1">
+                  <a:solidFill>
+                    <a:srgbClr val="00B050"/>
+                  </a:solidFill>
+                </a:rPr>
+                <a:t>y</a:t>
+              </a:r>
+            </a:p>
+          </p:txBody>
+        </p:sp>
+        <mc:AlternateContent xmlns:mc="http://schemas.openxmlformats.org/markup-compatibility/2006">
+          <mc:Choice xmlns:a14="http://schemas.microsoft.com/office/drawing/2010/main" Requires="a14">
+            <p:sp>
+              <p:nvSpPr>
+                <p:cNvPr id="46" name="TextBox 45">
+                  <a:extLst>
+                    <a:ext uri="{FF2B5EF4-FFF2-40B4-BE49-F238E27FC236}">
+                      <a16:creationId xmlns:a16="http://schemas.microsoft.com/office/drawing/2014/main" id="{424FF002-D999-2644-BC8E-7BAAF31B4D84}"/>
+                    </a:ext>
+                  </a:extLst>
+                </p:cNvPr>
+                <p:cNvSpPr txBox="1"/>
+                <p:nvPr/>
+              </p:nvSpPr>
+              <p:spPr>
+                <a:xfrm rot="16200000">
+                  <a:off x="3211602" y="3709177"/>
+                  <a:ext cx="703334" cy="261610"/>
+                </a:xfrm>
+                <a:prstGeom prst="rect">
+                  <a:avLst/>
+                </a:prstGeom>
+                <a:noFill/>
+              </p:spPr>
+              <p:txBody>
+                <a:bodyPr wrap="none" rtlCol="0">
+                  <a:spAutoFit/>
+                </a:bodyPr>
+                <a:lstStyle/>
+                <a:p>
+                  <a:pPr/>
+                  <a14:m>
+                    <m:oMathPara xmlns:m="http://schemas.openxmlformats.org/officeDocument/2006/math">
+                      <m:oMathParaPr>
+                        <m:jc m:val="centerGroup"/>
+                      </m:oMathParaPr>
+                      <m:oMath xmlns:m="http://schemas.openxmlformats.org/officeDocument/2006/math">
+                        <m:r>
+                          <a:rPr lang="fr-FR" sz="1100" b="0" i="0" smtClean="0">
+                            <a:latin typeface="Cambria Math" panose="02040503050406030204" pitchFamily="18" charset="0"/>
+                          </a:rPr>
+                          <m:t>−</m:t>
+                        </m:r>
+                        <m:r>
+                          <m:rPr>
+                            <m:sty m:val="p"/>
+                          </m:rPr>
+                          <a:rPr lang="fr-FR" sz="1100" b="0" i="0" smtClean="0">
+                            <a:latin typeface="Cambria Math" panose="02040503050406030204" pitchFamily="18" charset="0"/>
+                          </a:rPr>
+                          <m:t>sin</m:t>
+                        </m:r>
+                        <m:r>
+                          <a:rPr lang="fr-FR" sz="1100" b="0" i="1" smtClean="0">
+                            <a:latin typeface="Cambria Math" panose="02040503050406030204" pitchFamily="18" charset="0"/>
+                          </a:rPr>
+                          <m:t>⁡(</m:t>
+                        </m:r>
+                        <m:r>
+                          <a:rPr lang="fr-FR" sz="1100" b="0" i="1" smtClean="0">
+                            <a:latin typeface="Cambria Math" panose="02040503050406030204" pitchFamily="18" charset="0"/>
+                          </a:rPr>
+                          <m:t>𝜃</m:t>
+                        </m:r>
+                        <m:r>
+                          <a:rPr lang="fr-FR" sz="1100" b="0" i="1" smtClean="0">
+                            <a:latin typeface="Cambria Math" panose="02040503050406030204" pitchFamily="18" charset="0"/>
+                          </a:rPr>
+                          <m:t>)</m:t>
+                        </m:r>
+                      </m:oMath>
+                    </m:oMathPara>
+                  </a14:m>
+                  <a:endParaRPr lang="fr-CA" sz="1100" dirty="0"/>
+                </a:p>
+              </p:txBody>
+            </p:sp>
+          </mc:Choice>
+          <mc:Fallback>
+            <p:sp>
+              <p:nvSpPr>
+                <p:cNvPr id="46" name="TextBox 45">
+                  <a:extLst>
+                    <a:ext uri="{FF2B5EF4-FFF2-40B4-BE49-F238E27FC236}">
+                      <a16:creationId xmlns:a16="http://schemas.microsoft.com/office/drawing/2014/main" id="{424FF002-D999-2644-BC8E-7BAAF31B4D84}"/>
+                    </a:ext>
+                  </a:extLst>
+                </p:cNvPr>
+                <p:cNvSpPr txBox="1">
+                  <a:spLocks noRot="1" noChangeAspect="1" noMove="1" noResize="1" noEditPoints="1" noAdjustHandles="1" noChangeArrowheads="1" noChangeShapeType="1" noTextEdit="1"/>
+                </p:cNvSpPr>
+                <p:nvPr/>
+              </p:nvSpPr>
+              <p:spPr>
+                <a:xfrm rot="16200000">
+                  <a:off x="3211602" y="3709177"/>
+                  <a:ext cx="703334" cy="261610"/>
+                </a:xfrm>
+                <a:prstGeom prst="rect">
+                  <a:avLst/>
+                </a:prstGeom>
+                <a:blipFill>
+                  <a:blip r:embed="rId6"/>
+                  <a:stretch>
+                    <a:fillRect r="-4545"/>
+                  </a:stretch>
+                </a:blipFill>
+              </p:spPr>
+              <p:txBody>
+                <a:bodyPr/>
+                <a:lstStyle/>
+                <a:p>
+                  <a:r>
+                    <a:rPr lang="fr-CA">
+                      <a:noFill/>
+                    </a:rPr>
+                    <a:t> </a:t>
+                  </a:r>
+                </a:p>
+              </p:txBody>
+            </p:sp>
+          </mc:Fallback>
+        </mc:AlternateContent>
+        <mc:AlternateContent xmlns:mc="http://schemas.openxmlformats.org/markup-compatibility/2006">
+          <mc:Choice xmlns:a14="http://schemas.microsoft.com/office/drawing/2010/main" Requires="a14">
+            <p:sp>
+              <p:nvSpPr>
+                <p:cNvPr id="47" name="TextBox 46">
+                  <a:extLst>
+                    <a:ext uri="{FF2B5EF4-FFF2-40B4-BE49-F238E27FC236}">
+                      <a16:creationId xmlns:a16="http://schemas.microsoft.com/office/drawing/2014/main" id="{565FED7E-6947-3D41-9E1E-BA51EEF89A04}"/>
+                    </a:ext>
+                  </a:extLst>
+                </p:cNvPr>
+                <p:cNvSpPr txBox="1"/>
+                <p:nvPr/>
+              </p:nvSpPr>
+              <p:spPr>
+                <a:xfrm>
+                  <a:off x="4418125" y="1872249"/>
+                  <a:ext cx="618374" cy="261610"/>
+                </a:xfrm>
+                <a:prstGeom prst="rect">
+                  <a:avLst/>
+                </a:prstGeom>
+                <a:noFill/>
+              </p:spPr>
+              <p:txBody>
+                <a:bodyPr wrap="none" rtlCol="0">
+                  <a:spAutoFit/>
+                </a:bodyPr>
+                <a:lstStyle/>
+                <a:p>
+                  <a:pPr/>
+                  <a14:m>
+                    <m:oMathPara xmlns:m="http://schemas.openxmlformats.org/officeDocument/2006/math">
+                      <m:oMathParaPr>
+                        <m:jc m:val="centerGroup"/>
+                      </m:oMathParaPr>
+                      <m:oMath xmlns:m="http://schemas.openxmlformats.org/officeDocument/2006/math">
+                        <m:r>
+                          <m:rPr>
+                            <m:sty m:val="p"/>
+                          </m:rPr>
+                          <a:rPr lang="fr-FR" sz="1100" b="0" i="0" smtClean="0">
+                            <a:latin typeface="Cambria Math" panose="02040503050406030204" pitchFamily="18" charset="0"/>
+                          </a:rPr>
+                          <m:t>cos</m:t>
+                        </m:r>
+                        <m:r>
+                          <a:rPr lang="fr-FR" sz="1100" b="0" i="1" smtClean="0">
+                            <a:latin typeface="Cambria Math" panose="02040503050406030204" pitchFamily="18" charset="0"/>
+                          </a:rPr>
+                          <m:t>⁡(</m:t>
+                        </m:r>
+                        <m:r>
+                          <a:rPr lang="fr-FR" sz="1100" b="0" i="1" smtClean="0">
+                            <a:latin typeface="Cambria Math" panose="02040503050406030204" pitchFamily="18" charset="0"/>
+                          </a:rPr>
+                          <m:t>𝜃</m:t>
+                        </m:r>
+                        <m:r>
+                          <a:rPr lang="fr-FR" sz="1100" b="0" i="1" smtClean="0">
+                            <a:latin typeface="Cambria Math" panose="02040503050406030204" pitchFamily="18" charset="0"/>
+                          </a:rPr>
+                          <m:t>)</m:t>
+                        </m:r>
+                      </m:oMath>
+                    </m:oMathPara>
+                  </a14:m>
+                  <a:endParaRPr lang="fr-CA" sz="1100" dirty="0"/>
+                </a:p>
+              </p:txBody>
+            </p:sp>
+          </mc:Choice>
+          <mc:Fallback>
+            <p:sp>
+              <p:nvSpPr>
+                <p:cNvPr id="47" name="TextBox 46">
+                  <a:extLst>
+                    <a:ext uri="{FF2B5EF4-FFF2-40B4-BE49-F238E27FC236}">
+                      <a16:creationId xmlns:a16="http://schemas.microsoft.com/office/drawing/2014/main" id="{565FED7E-6947-3D41-9E1E-BA51EEF89A04}"/>
+                    </a:ext>
+                  </a:extLst>
+                </p:cNvPr>
+                <p:cNvSpPr txBox="1">
+                  <a:spLocks noRot="1" noChangeAspect="1" noMove="1" noResize="1" noEditPoints="1" noAdjustHandles="1" noChangeArrowheads="1" noChangeShapeType="1" noTextEdit="1"/>
+                </p:cNvSpPr>
+                <p:nvPr/>
+              </p:nvSpPr>
+              <p:spPr>
+                <a:xfrm>
+                  <a:off x="4418125" y="1872249"/>
+                  <a:ext cx="618374" cy="261610"/>
+                </a:xfrm>
+                <a:prstGeom prst="rect">
+                  <a:avLst/>
+                </a:prstGeom>
+                <a:blipFill>
+                  <a:blip r:embed="rId7"/>
+                  <a:stretch>
+                    <a:fillRect b="-4545"/>
+                  </a:stretch>
+                </a:blipFill>
+              </p:spPr>
+              <p:txBody>
+                <a:bodyPr/>
+                <a:lstStyle/>
+                <a:p>
+                  <a:r>
+                    <a:rPr lang="fr-CA">
+                      <a:noFill/>
+                    </a:rPr>
+                    <a:t> </a:t>
+                  </a:r>
+                </a:p>
+              </p:txBody>
+            </p:sp>
+          </mc:Fallback>
+        </mc:AlternateContent>
+        <p:sp>
+          <p:nvSpPr>
+            <p:cNvPr id="48" name="TextBox 47">
+              <a:extLst>
+                <a:ext uri="{FF2B5EF4-FFF2-40B4-BE49-F238E27FC236}">
+                  <a16:creationId xmlns:a16="http://schemas.microsoft.com/office/drawing/2014/main" id="{62AD6633-58C6-9F41-9D05-275E846B3C80}"/>
+                </a:ext>
+              </a:extLst>
+            </p:cNvPr>
+            <p:cNvSpPr txBox="1"/>
+            <p:nvPr/>
+          </p:nvSpPr>
+          <p:spPr>
+            <a:xfrm rot="19800000">
+              <a:off x="5022179" y="2793344"/>
+              <a:ext cx="301686" cy="369332"/>
+            </a:xfrm>
+            <a:prstGeom prst="rect">
+              <a:avLst/>
+            </a:prstGeom>
+            <a:noFill/>
+          </p:spPr>
+          <p:txBody>
+            <a:bodyPr wrap="none" rtlCol="0">
+              <a:spAutoFit/>
+            </a:bodyPr>
+            <a:lstStyle/>
+            <a:p>
+              <a:r>
+                <a:rPr lang="fr-CA" noProof="1">
+                  <a:solidFill>
+                    <a:srgbClr val="FF0000"/>
+                  </a:solidFill>
+                </a:rPr>
+                <a:t>1</a:t>
+              </a:r>
+            </a:p>
+          </p:txBody>
+        </p:sp>
+        <p:sp>
+          <p:nvSpPr>
+            <p:cNvPr id="49" name="TextBox 48">
+              <a:extLst>
+                <a:ext uri="{FF2B5EF4-FFF2-40B4-BE49-F238E27FC236}">
+                  <a16:creationId xmlns:a16="http://schemas.microsoft.com/office/drawing/2014/main" id="{865FEE61-21B8-C24D-B774-E00074F21274}"/>
+                </a:ext>
+              </a:extLst>
+            </p:cNvPr>
+            <p:cNvSpPr txBox="1"/>
+            <p:nvPr/>
+          </p:nvSpPr>
+          <p:spPr>
+            <a:xfrm rot="19800000">
+              <a:off x="3759417" y="2700542"/>
+              <a:ext cx="301686" cy="369332"/>
+            </a:xfrm>
+            <a:prstGeom prst="rect">
+              <a:avLst/>
+            </a:prstGeom>
+            <a:noFill/>
+          </p:spPr>
+          <p:txBody>
+            <a:bodyPr wrap="none" rtlCol="0">
+              <a:spAutoFit/>
+            </a:bodyPr>
+            <a:lstStyle/>
+            <a:p>
+              <a:r>
+                <a:rPr lang="fr-CA" noProof="1">
+                  <a:solidFill>
+                    <a:srgbClr val="00A000"/>
+                  </a:solidFill>
+                </a:rPr>
+                <a:t>1</a:t>
+              </a:r>
+            </a:p>
+          </p:txBody>
+        </p:sp>
+      </p:grpSp>
+      <p:grpSp>
+        <p:nvGrpSpPr>
+          <p:cNvPr id="33" name="Group 32">
+            <a:extLst>
+              <a:ext uri="{FF2B5EF4-FFF2-40B4-BE49-F238E27FC236}">
+                <a16:creationId xmlns:a16="http://schemas.microsoft.com/office/drawing/2014/main" id="{8C01ACA3-32D6-4943-9D8A-490BC3D40946}"/>
+              </a:ext>
+            </a:extLst>
+          </p:cNvPr>
+          <p:cNvGrpSpPr/>
+          <p:nvPr/>
+        </p:nvGrpSpPr>
+        <p:grpSpPr>
+          <a:xfrm rot="19800000">
+            <a:off x="7421866" y="778803"/>
+            <a:ext cx="2484902" cy="1992233"/>
             <a:chOff x="4403242" y="1763486"/>
-            <a:chExt cx="2841294" cy="1992172"/>
+            <a:chExt cx="2484902" cy="1992233"/>
           </a:xfrm>
         </p:grpSpPr>
         <p:cxnSp>
           <p:nvCxnSpPr>
-            <p:cNvPr id="5" name="Straight Arrow Connector 4">
+            <p:cNvPr id="67" name="Straight Arrow Connector 66">
               <a:extLst>
                 <a:ext uri="{FF2B5EF4-FFF2-40B4-BE49-F238E27FC236}">
-                  <a16:creationId xmlns:a16="http://schemas.microsoft.com/office/drawing/2014/main" id="{E4C27EC6-B759-914C-A0F0-1E2A2FB7DAA1}"/>
+                  <a16:creationId xmlns:a16="http://schemas.microsoft.com/office/drawing/2014/main" id="{ED50BDE8-3195-454C-8BA2-967906FEBFAA}"/>
                 </a:ext>
               </a:extLst>
             </p:cNvPr>
@@ -18664,7 +20112,7 @@
             <a:prstGeom prst="straightConnector1">
               <a:avLst/>
             </a:prstGeom>
-            <a:ln w="12700">
+            <a:ln w="38100">
               <a:solidFill>
                 <a:srgbClr val="FF0000"/>
               </a:solidFill>
@@ -18688,10 +20136,10 @@
         </p:cxnSp>
         <p:cxnSp>
           <p:nvCxnSpPr>
-            <p:cNvPr id="6" name="Straight Arrow Connector 5">
+            <p:cNvPr id="68" name="Straight Arrow Connector 67">
               <a:extLst>
                 <a:ext uri="{FF2B5EF4-FFF2-40B4-BE49-F238E27FC236}">
-                  <a16:creationId xmlns:a16="http://schemas.microsoft.com/office/drawing/2014/main" id="{F204628A-117F-084C-AAC5-8779B2BB0C2D}"/>
+                  <a16:creationId xmlns:a16="http://schemas.microsoft.com/office/drawing/2014/main" id="{78B98AA3-38E5-4545-B452-61044DD1818B}"/>
                 </a:ext>
               </a:extLst>
             </p:cNvPr>
@@ -18708,7 +20156,7 @@
             <a:prstGeom prst="straightConnector1">
               <a:avLst/>
             </a:prstGeom>
-            <a:ln w="12700">
+            <a:ln w="38100">
               <a:solidFill>
                 <a:srgbClr val="00B050"/>
               </a:solidFill>
@@ -18732,10 +20180,10 @@
         </p:cxnSp>
         <p:sp>
           <p:nvSpPr>
-            <p:cNvPr id="7" name="Oval 6">
+            <p:cNvPr id="69" name="Oval 68">
               <a:extLst>
                 <a:ext uri="{FF2B5EF4-FFF2-40B4-BE49-F238E27FC236}">
-                  <a16:creationId xmlns:a16="http://schemas.microsoft.com/office/drawing/2014/main" id="{DEC91F2C-436E-2144-BF37-33604A63D8BA}"/>
+                  <a16:creationId xmlns:a16="http://schemas.microsoft.com/office/drawing/2014/main" id="{E2035BE8-ED6B-AE40-BC66-1D0FDE954D1A}"/>
                 </a:ext>
               </a:extLst>
             </p:cNvPr>
@@ -18788,10 +20236,10 @@
         </p:sp>
         <p:sp>
           <p:nvSpPr>
-            <p:cNvPr id="4" name="TextBox 3">
+            <p:cNvPr id="70" name="TextBox 69">
               <a:extLst>
                 <a:ext uri="{FF2B5EF4-FFF2-40B4-BE49-F238E27FC236}">
-                  <a16:creationId xmlns:a16="http://schemas.microsoft.com/office/drawing/2014/main" id="{7052713B-C885-4348-B849-679E993CE69B}"/>
+                  <a16:creationId xmlns:a16="http://schemas.microsoft.com/office/drawing/2014/main" id="{926BCA6F-8EF6-5247-8F0E-9CDE72C493AB}"/>
                 </a:ext>
               </a:extLst>
             </p:cNvPr>
@@ -18800,8 +20248,8 @@
           </p:nvSpPr>
           <p:spPr>
             <a:xfrm>
-              <a:off x="6490804" y="3386326"/>
-              <a:ext cx="753732" cy="369332"/>
+              <a:off x="6269385" y="3386387"/>
+              <a:ext cx="618759" cy="369332"/>
             </a:xfrm>
             <a:prstGeom prst="rect">
               <a:avLst/>
@@ -18816,18 +20264,56 @@
             <a:p>
               <a:r>
                 <a:rPr lang="fr-CA" noProof="1"/>
-                <a:t>global</a:t>
+                <a:t>local</a:t>
               </a:r>
             </a:p>
           </p:txBody>
         </p:sp>
       </p:grpSp>
+      <p:cxnSp>
+        <p:nvCxnSpPr>
+          <p:cNvPr id="34" name="Straight Connector 33">
+            <a:extLst>
+              <a:ext uri="{FF2B5EF4-FFF2-40B4-BE49-F238E27FC236}">
+                <a16:creationId xmlns:a16="http://schemas.microsoft.com/office/drawing/2014/main" id="{FBFF4EB6-E1D0-6B40-B912-B32EBCB18078}"/>
+              </a:ext>
+            </a:extLst>
+          </p:cNvPr>
+          <p:cNvCxnSpPr>
+            <a:cxnSpLocks/>
+          </p:cNvCxnSpPr>
+          <p:nvPr/>
+        </p:nvCxnSpPr>
+        <p:spPr>
+          <a:xfrm flipH="1">
+            <a:off x="7224116" y="3064134"/>
+            <a:ext cx="532315" cy="0"/>
+          </a:xfrm>
+          <a:prstGeom prst="line">
+            <a:avLst/>
+          </a:prstGeom>
+        </p:spPr>
+        <p:style>
+          <a:lnRef idx="1">
+            <a:schemeClr val="accent1"/>
+          </a:lnRef>
+          <a:fillRef idx="0">
+            <a:schemeClr val="accent1"/>
+          </a:fillRef>
+          <a:effectRef idx="0">
+            <a:schemeClr val="accent1"/>
+          </a:effectRef>
+          <a:fontRef idx="minor">
+            <a:schemeClr val="tx1"/>
+          </a:fontRef>
+        </p:style>
+      </p:cxnSp>
       <p:grpSp>
         <p:nvGrpSpPr>
-          <p:cNvPr id="20" name="Group 19">
+          <p:cNvPr id="40" name="Group 39">
             <a:extLst>
               <a:ext uri="{FF2B5EF4-FFF2-40B4-BE49-F238E27FC236}">
-                <a16:creationId xmlns:a16="http://schemas.microsoft.com/office/drawing/2014/main" id="{11A70ECD-AC8D-E640-B548-F009D1DB0686}"/>
+                <a16:creationId xmlns:a16="http://schemas.microsoft.com/office/drawing/2014/main" id="{F1FBB5EC-D187-2A4D-B07A-9BC98A1F290C}"/>
               </a:ext>
             </a:extLst>
           </p:cNvPr>
@@ -18835,19 +20321,19 @@
           <p:nvPr/>
         </p:nvGrpSpPr>
         <p:grpSpPr>
-          <a:xfrm rot="19800000">
-            <a:off x="3808150" y="1184400"/>
-            <a:ext cx="2895709" cy="1970691"/>
+          <a:xfrm>
+            <a:off x="7691975" y="1256628"/>
+            <a:ext cx="2841294" cy="1992172"/>
             <a:chOff x="4403242" y="1763486"/>
-            <a:chExt cx="2895709" cy="1970691"/>
+            <a:chExt cx="2841294" cy="1992172"/>
           </a:xfrm>
         </p:grpSpPr>
         <p:cxnSp>
           <p:nvCxnSpPr>
-            <p:cNvPr id="21" name="Straight Arrow Connector 20">
+            <p:cNvPr id="63" name="Straight Arrow Connector 62">
               <a:extLst>
                 <a:ext uri="{FF2B5EF4-FFF2-40B4-BE49-F238E27FC236}">
-                  <a16:creationId xmlns:a16="http://schemas.microsoft.com/office/drawing/2014/main" id="{60E64938-A112-7344-B832-6F1A4D148C4A}"/>
+                  <a16:creationId xmlns:a16="http://schemas.microsoft.com/office/drawing/2014/main" id="{18402199-E377-B740-AA53-72C1DCADABDD}"/>
                 </a:ext>
               </a:extLst>
             </p:cNvPr>
@@ -18864,7 +20350,7 @@
             <a:prstGeom prst="straightConnector1">
               <a:avLst/>
             </a:prstGeom>
-            <a:ln w="38100">
+            <a:ln w="12700">
               <a:solidFill>
                 <a:srgbClr val="FF0000"/>
               </a:solidFill>
@@ -18888,10 +20374,10 @@
         </p:cxnSp>
         <p:cxnSp>
           <p:nvCxnSpPr>
-            <p:cNvPr id="22" name="Straight Arrow Connector 21">
+            <p:cNvPr id="64" name="Straight Arrow Connector 63">
               <a:extLst>
                 <a:ext uri="{FF2B5EF4-FFF2-40B4-BE49-F238E27FC236}">
-                  <a16:creationId xmlns:a16="http://schemas.microsoft.com/office/drawing/2014/main" id="{9B6D9146-A90B-6E40-9E97-96801B4B2ACD}"/>
+                  <a16:creationId xmlns:a16="http://schemas.microsoft.com/office/drawing/2014/main" id="{90691669-A955-A647-94B4-2BF5B0C26DAA}"/>
                 </a:ext>
               </a:extLst>
             </p:cNvPr>
@@ -18908,7 +20394,7 @@
             <a:prstGeom prst="straightConnector1">
               <a:avLst/>
             </a:prstGeom>
-            <a:ln w="38100">
+            <a:ln w="12700">
               <a:solidFill>
                 <a:srgbClr val="00B050"/>
               </a:solidFill>
@@ -18932,10 +20418,10 @@
         </p:cxnSp>
         <p:sp>
           <p:nvSpPr>
-            <p:cNvPr id="23" name="Oval 22">
+            <p:cNvPr id="65" name="Oval 64">
               <a:extLst>
                 <a:ext uri="{FF2B5EF4-FFF2-40B4-BE49-F238E27FC236}">
-                  <a16:creationId xmlns:a16="http://schemas.microsoft.com/office/drawing/2014/main" id="{B110AC7B-51BE-BC48-83A9-1D93DCD5F5A0}"/>
+                  <a16:creationId xmlns:a16="http://schemas.microsoft.com/office/drawing/2014/main" id="{8C60EC1C-53FB-9A49-A2EC-3D63203C5215}"/>
                 </a:ext>
               </a:extLst>
             </p:cNvPr>
@@ -18988,10 +20474,10 @@
         </p:sp>
         <p:sp>
           <p:nvSpPr>
-            <p:cNvPr id="24" name="TextBox 23">
+            <p:cNvPr id="66" name="TextBox 65">
               <a:extLst>
                 <a:ext uri="{FF2B5EF4-FFF2-40B4-BE49-F238E27FC236}">
-                  <a16:creationId xmlns:a16="http://schemas.microsoft.com/office/drawing/2014/main" id="{CD807CCC-D963-5B4E-8863-1AC6FD45D06B}"/>
+                  <a16:creationId xmlns:a16="http://schemas.microsoft.com/office/drawing/2014/main" id="{E28CB23F-01F2-8A46-A5B4-01ED54F559EC}"/>
                 </a:ext>
               </a:extLst>
             </p:cNvPr>
@@ -19000,8 +20486,8 @@
           </p:nvSpPr>
           <p:spPr>
             <a:xfrm>
-              <a:off x="6279120" y="3364845"/>
-              <a:ext cx="1019831" cy="369332"/>
+              <a:off x="6490804" y="3386326"/>
+              <a:ext cx="753732" cy="369332"/>
             </a:xfrm>
             <a:prstGeom prst="rect">
               <a:avLst/>
@@ -19016,210 +20502,54 @@
             <a:p>
               <a:r>
                 <a:rPr lang="fr-CA" noProof="1"/>
-                <a:t>humerus</a:t>
+                <a:t>global</a:t>
               </a:r>
             </a:p>
           </p:txBody>
         </p:sp>
       </p:grpSp>
-      <mc:AlternateContent xmlns:mc="http://schemas.openxmlformats.org/markup-compatibility/2006" xmlns:a14="http://schemas.microsoft.com/office/drawing/2010/main">
-        <mc:Choice Requires="a14">
-          <p:sp>
-            <p:nvSpPr>
-              <p:cNvPr id="26" name="TextBox 25">
-                <a:extLst>
-                  <a:ext uri="{FF2B5EF4-FFF2-40B4-BE49-F238E27FC236}">
-                    <a16:creationId xmlns:a16="http://schemas.microsoft.com/office/drawing/2014/main" id="{9FDAA357-AF61-004C-AF14-808D8AB75A1E}"/>
-                  </a:ext>
-                </a:extLst>
-              </p:cNvPr>
-              <p:cNvSpPr txBox="1"/>
-              <p:nvPr/>
-            </p:nvSpPr>
-            <p:spPr>
-              <a:xfrm>
-                <a:off x="4734415" y="3242006"/>
-                <a:ext cx="374140" cy="369332"/>
-              </a:xfrm>
-              <a:prstGeom prst="rect">
-                <a:avLst/>
-              </a:prstGeom>
-              <a:noFill/>
-            </p:spPr>
-            <p:txBody>
-              <a:bodyPr wrap="none" rtlCol="0">
-                <a:spAutoFit/>
-              </a:bodyPr>
-              <a:lstStyle/>
-              <a:p>
-                <a:pPr/>
-                <a14:m>
-                  <m:oMathPara xmlns:m="http://schemas.openxmlformats.org/officeDocument/2006/math">
-                    <m:oMathParaPr>
-                      <m:jc m:val="centerGroup"/>
-                    </m:oMathParaPr>
-                    <m:oMath xmlns:m="http://schemas.openxmlformats.org/officeDocument/2006/math">
-                      <m:r>
-                        <a:rPr lang="fr-FR" b="0" i="1" noProof="1" smtClean="0">
-                          <a:latin typeface="Cambria Math" panose="02040503050406030204" pitchFamily="18" charset="0"/>
-                        </a:rPr>
-                        <m:t>𝜃</m:t>
-                      </m:r>
-                    </m:oMath>
-                  </m:oMathPara>
-                </a14:m>
-                <a:endParaRPr lang="fr-CA" noProof="1"/>
-              </a:p>
-            </p:txBody>
-          </p:sp>
-        </mc:Choice>
-        <mc:Fallback xmlns="">
-          <p:sp>
-            <p:nvSpPr>
-              <p:cNvPr id="26" name="TextBox 25">
-                <a:extLst>
-                  <a:ext uri="{FF2B5EF4-FFF2-40B4-BE49-F238E27FC236}">
-                    <a16:creationId xmlns:a16="http://schemas.microsoft.com/office/drawing/2014/main" id="{9FDAA357-AF61-004C-AF14-808D8AB75A1E}"/>
-                  </a:ext>
-                </a:extLst>
-              </p:cNvPr>
-              <p:cNvSpPr txBox="1">
-                <a:spLocks noRot="1" noChangeAspect="1" noMove="1" noResize="1" noEditPoints="1" noAdjustHandles="1" noChangeArrowheads="1" noChangeShapeType="1" noTextEdit="1"/>
-              </p:cNvSpPr>
-              <p:nvPr/>
-            </p:nvSpPr>
-            <p:spPr>
-              <a:xfrm>
-                <a:off x="4734415" y="3242006"/>
-                <a:ext cx="374140" cy="369332"/>
-              </a:xfrm>
-              <a:prstGeom prst="rect">
-                <a:avLst/>
-              </a:prstGeom>
-              <a:blipFill>
-                <a:blip r:embed="rId2"/>
-                <a:stretch>
-                  <a:fillRect/>
-                </a:stretch>
-              </a:blipFill>
-            </p:spPr>
-            <p:txBody>
-              <a:bodyPr/>
-              <a:lstStyle/>
-              <a:p>
-                <a:r>
-                  <a:rPr lang="fr-CA">
-                    <a:noFill/>
-                  </a:rPr>
-                  <a:t> </a:t>
-                </a:r>
-              </a:p>
-            </p:txBody>
-          </p:sp>
-        </mc:Fallback>
-      </mc:AlternateContent>
-      <mc:AlternateContent xmlns:mc="http://schemas.openxmlformats.org/markup-compatibility/2006" xmlns:a14="http://schemas.microsoft.com/office/drawing/2010/main">
-        <mc:Choice Requires="a14">
-          <p:sp>
-            <p:nvSpPr>
-              <p:cNvPr id="28" name="TextBox 27">
-                <a:extLst>
-                  <a:ext uri="{FF2B5EF4-FFF2-40B4-BE49-F238E27FC236}">
-                    <a16:creationId xmlns:a16="http://schemas.microsoft.com/office/drawing/2014/main" id="{847031B9-2193-5B4D-A965-5D5BC00F57AF}"/>
-                  </a:ext>
-                </a:extLst>
-              </p:cNvPr>
-              <p:cNvSpPr txBox="1"/>
-              <p:nvPr/>
-            </p:nvSpPr>
-            <p:spPr>
-              <a:xfrm>
-                <a:off x="4167155" y="2979431"/>
-                <a:ext cx="374140" cy="369332"/>
-              </a:xfrm>
-              <a:prstGeom prst="rect">
-                <a:avLst/>
-              </a:prstGeom>
-              <a:noFill/>
-            </p:spPr>
-            <p:txBody>
-              <a:bodyPr wrap="none" rtlCol="0">
-                <a:spAutoFit/>
-              </a:bodyPr>
-              <a:lstStyle/>
-              <a:p>
-                <a:pPr/>
-                <a14:m>
-                  <m:oMathPara xmlns:m="http://schemas.openxmlformats.org/officeDocument/2006/math">
-                    <m:oMathParaPr>
-                      <m:jc m:val="centerGroup"/>
-                    </m:oMathParaPr>
-                    <m:oMath xmlns:m="http://schemas.openxmlformats.org/officeDocument/2006/math">
-                      <m:r>
-                        <a:rPr lang="fr-FR" b="0" i="1" noProof="1" smtClean="0">
-                          <a:latin typeface="Cambria Math" panose="02040503050406030204" pitchFamily="18" charset="0"/>
-                        </a:rPr>
-                        <m:t>𝜃</m:t>
-                      </m:r>
-                    </m:oMath>
-                  </m:oMathPara>
-                </a14:m>
-                <a:endParaRPr lang="fr-CA" noProof="1"/>
-              </a:p>
-            </p:txBody>
-          </p:sp>
-        </mc:Choice>
-        <mc:Fallback xmlns="">
-          <p:sp>
-            <p:nvSpPr>
-              <p:cNvPr id="28" name="TextBox 27">
-                <a:extLst>
-                  <a:ext uri="{FF2B5EF4-FFF2-40B4-BE49-F238E27FC236}">
-                    <a16:creationId xmlns:a16="http://schemas.microsoft.com/office/drawing/2014/main" id="{847031B9-2193-5B4D-A965-5D5BC00F57AF}"/>
-                  </a:ext>
-                </a:extLst>
-              </p:cNvPr>
-              <p:cNvSpPr txBox="1">
-                <a:spLocks noRot="1" noChangeAspect="1" noMove="1" noResize="1" noEditPoints="1" noAdjustHandles="1" noChangeArrowheads="1" noChangeShapeType="1" noTextEdit="1"/>
-              </p:cNvSpPr>
-              <p:nvPr/>
-            </p:nvSpPr>
-            <p:spPr>
-              <a:xfrm>
-                <a:off x="4167155" y="2979431"/>
-                <a:ext cx="374140" cy="369332"/>
-              </a:xfrm>
-              <a:prstGeom prst="rect">
-                <a:avLst/>
-              </a:prstGeom>
-              <a:blipFill>
-                <a:blip r:embed="rId3"/>
-                <a:stretch>
-                  <a:fillRect/>
-                </a:stretch>
-              </a:blipFill>
-            </p:spPr>
-            <p:txBody>
-              <a:bodyPr/>
-              <a:lstStyle/>
-              <a:p>
-                <a:r>
-                  <a:rPr lang="fr-CA">
-                    <a:noFill/>
-                  </a:rPr>
-                  <a:t> </a:t>
-                </a:r>
-              </a:p>
-            </p:txBody>
-          </p:sp>
-        </mc:Fallback>
-      </mc:AlternateContent>
+      <p:sp>
+        <p:nvSpPr>
+          <p:cNvPr id="41" name="TextBox 40">
+            <a:extLst>
+              <a:ext uri="{FF2B5EF4-FFF2-40B4-BE49-F238E27FC236}">
+                <a16:creationId xmlns:a16="http://schemas.microsoft.com/office/drawing/2014/main" id="{CA5A1EBB-71DD-5640-A704-4E6B074707D3}"/>
+              </a:ext>
+            </a:extLst>
+          </p:cNvPr>
+          <p:cNvSpPr txBox="1"/>
+          <p:nvPr/>
+        </p:nvSpPr>
+        <p:spPr>
+          <a:xfrm>
+            <a:off x="8597791" y="2710399"/>
+            <a:ext cx="497252" cy="369332"/>
+          </a:xfrm>
+          <a:prstGeom prst="rect">
+            <a:avLst/>
+          </a:prstGeom>
+          <a:noFill/>
+        </p:spPr>
+        <p:txBody>
+          <a:bodyPr wrap="none" rtlCol="0">
+            <a:spAutoFit/>
+          </a:bodyPr>
+          <a:lstStyle/>
+          <a:p>
+            <a:pPr/>
+            <a:r>
+              <a:rPr lang="fr-CA" noProof="1"/>
+              <a:t>30°</a:t>
+            </a:r>
+          </a:p>
+        </p:txBody>
+      </p:sp>
       <p:cxnSp>
         <p:nvCxnSpPr>
-          <p:cNvPr id="30" name="Straight Connector 29">
+          <p:cNvPr id="51" name="Straight Connector 50">
             <a:extLst>
               <a:ext uri="{FF2B5EF4-FFF2-40B4-BE49-F238E27FC236}">
-                <a16:creationId xmlns:a16="http://schemas.microsoft.com/office/drawing/2014/main" id="{D0E64ADD-00BA-064E-A6C7-E639E8CB2A06}"/>
+                <a16:creationId xmlns:a16="http://schemas.microsoft.com/office/drawing/2014/main" id="{F1B841DC-7150-DD41-A6D3-0F23A23FA44D}"/>
               </a:ext>
             </a:extLst>
           </p:cNvPr>
@@ -19230,8 +20560,8 @@
         </p:nvCxnSpPr>
         <p:spPr>
           <a:xfrm>
-            <a:off x="6006747" y="2732867"/>
-            <a:ext cx="0" cy="838125"/>
+            <a:off x="9291265" y="2468156"/>
+            <a:ext cx="0" cy="592985"/>
           </a:xfrm>
           <a:prstGeom prst="line">
             <a:avLst/>
@@ -19254,10 +20584,10 @@
       </p:cxnSp>
       <p:cxnSp>
         <p:nvCxnSpPr>
-          <p:cNvPr id="31" name="Straight Connector 30">
+          <p:cNvPr id="52" name="Straight Connector 51">
             <a:extLst>
               <a:ext uri="{FF2B5EF4-FFF2-40B4-BE49-F238E27FC236}">
-                <a16:creationId xmlns:a16="http://schemas.microsoft.com/office/drawing/2014/main" id="{1296E27F-C381-C64D-B10D-0A028C7A2928}"/>
+                <a16:creationId xmlns:a16="http://schemas.microsoft.com/office/drawing/2014/main" id="{18B2F633-CD8A-0841-A357-ADA67BD105A0}"/>
               </a:ext>
             </a:extLst>
           </p:cNvPr>
@@ -19268,8 +20598,8 @@
         </p:nvCxnSpPr>
         <p:spPr>
           <a:xfrm flipH="1">
-            <a:off x="4489469" y="2676629"/>
-            <a:ext cx="1380665" cy="0"/>
+            <a:off x="7745975" y="2320146"/>
+            <a:ext cx="1385669" cy="0"/>
           </a:xfrm>
           <a:prstGeom prst="line">
             <a:avLst/>
@@ -19290,322 +20620,12 @@
           </a:fontRef>
         </p:style>
       </p:cxnSp>
-      <p:cxnSp>
-        <p:nvCxnSpPr>
-          <p:cNvPr id="35" name="Straight Connector 34">
+      <p:sp>
+        <p:nvSpPr>
+          <p:cNvPr id="57" name="TextBox 56">
             <a:extLst>
               <a:ext uri="{FF2B5EF4-FFF2-40B4-BE49-F238E27FC236}">
-                <a16:creationId xmlns:a16="http://schemas.microsoft.com/office/drawing/2014/main" id="{D3B85616-3708-C344-81E9-7CF479361439}"/>
-              </a:ext>
-            </a:extLst>
-          </p:cNvPr>
-          <p:cNvCxnSpPr>
-            <a:cxnSpLocks/>
-          </p:cNvCxnSpPr>
-          <p:nvPr/>
-        </p:nvCxnSpPr>
-        <p:spPr>
-          <a:xfrm flipH="1">
-            <a:off x="3571473" y="2011959"/>
-            <a:ext cx="896224" cy="0"/>
-          </a:xfrm>
-          <a:prstGeom prst="line">
-            <a:avLst/>
-          </a:prstGeom>
-        </p:spPr>
-        <p:style>
-          <a:lnRef idx="1">
-            <a:schemeClr val="accent1"/>
-          </a:lnRef>
-          <a:fillRef idx="0">
-            <a:schemeClr val="accent1"/>
-          </a:fillRef>
-          <a:effectRef idx="0">
-            <a:schemeClr val="accent1"/>
-          </a:effectRef>
-          <a:fontRef idx="minor">
-            <a:schemeClr val="tx1"/>
-          </a:fontRef>
-        </p:style>
-      </p:cxnSp>
-      <p:cxnSp>
-        <p:nvCxnSpPr>
-          <p:cNvPr id="37" name="Straight Connector 36">
-            <a:extLst>
-              <a:ext uri="{FF2B5EF4-FFF2-40B4-BE49-F238E27FC236}">
-                <a16:creationId xmlns:a16="http://schemas.microsoft.com/office/drawing/2014/main" id="{0B80EF5C-B664-B548-B664-E1D7EC0A6D01}"/>
-              </a:ext>
-            </a:extLst>
-          </p:cNvPr>
-          <p:cNvCxnSpPr>
-            <a:cxnSpLocks/>
-          </p:cNvCxnSpPr>
-          <p:nvPr/>
-        </p:nvCxnSpPr>
-        <p:spPr>
-          <a:xfrm>
-            <a:off x="3557705" y="2057280"/>
-            <a:ext cx="11801" cy="1513748"/>
-          </a:xfrm>
-          <a:prstGeom prst="line">
-            <a:avLst/>
-          </a:prstGeom>
-        </p:spPr>
-        <p:style>
-          <a:lnRef idx="1">
-            <a:schemeClr val="accent1"/>
-          </a:lnRef>
-          <a:fillRef idx="0">
-            <a:schemeClr val="accent1"/>
-          </a:fillRef>
-          <a:effectRef idx="0">
-            <a:schemeClr val="accent1"/>
-          </a:effectRef>
-          <a:fontRef idx="minor">
-            <a:schemeClr val="tx1"/>
-          </a:fontRef>
-        </p:style>
-      </p:cxnSp>
-      <mc:AlternateContent xmlns:mc="http://schemas.openxmlformats.org/markup-compatibility/2006" xmlns:a14="http://schemas.microsoft.com/office/drawing/2010/main">
-        <mc:Choice Requires="a14">
-          <p:sp>
-            <p:nvSpPr>
-              <p:cNvPr id="42" name="TextBox 41">
-                <a:extLst>
-                  <a:ext uri="{FF2B5EF4-FFF2-40B4-BE49-F238E27FC236}">
-                    <a16:creationId xmlns:a16="http://schemas.microsoft.com/office/drawing/2014/main" id="{0BDBCBFB-2348-3047-9BD0-F7589E4E44F6}"/>
-                  </a:ext>
-                </a:extLst>
-              </p:cNvPr>
-              <p:cNvSpPr txBox="1"/>
-              <p:nvPr/>
-            </p:nvSpPr>
-            <p:spPr>
-              <a:xfrm rot="16200000">
-                <a:off x="5699375" y="3680073"/>
-                <a:ext cx="618374" cy="261610"/>
-              </a:xfrm>
-              <a:prstGeom prst="rect">
-                <a:avLst/>
-              </a:prstGeom>
-              <a:noFill/>
-            </p:spPr>
-            <p:txBody>
-              <a:bodyPr wrap="none" rtlCol="0">
-                <a:spAutoFit/>
-              </a:bodyPr>
-              <a:lstStyle/>
-              <a:p>
-                <a:pPr/>
-                <a14:m>
-                  <m:oMathPara xmlns:m="http://schemas.openxmlformats.org/officeDocument/2006/math">
-                    <m:oMathParaPr>
-                      <m:jc m:val="centerGroup"/>
-                    </m:oMathParaPr>
-                    <m:oMath xmlns:m="http://schemas.openxmlformats.org/officeDocument/2006/math">
-                      <m:r>
-                        <m:rPr>
-                          <m:sty m:val="p"/>
-                        </m:rPr>
-                        <a:rPr lang="fr-FR" sz="1100" b="0" i="0" smtClean="0">
-                          <a:latin typeface="Cambria Math" panose="02040503050406030204" pitchFamily="18" charset="0"/>
-                        </a:rPr>
-                        <m:t>cos</m:t>
-                      </m:r>
-                      <m:r>
-                        <a:rPr lang="fr-FR" sz="1100" b="0" i="1" smtClean="0">
-                          <a:latin typeface="Cambria Math" panose="02040503050406030204" pitchFamily="18" charset="0"/>
-                        </a:rPr>
-                        <m:t>⁡(</m:t>
-                      </m:r>
-                      <m:r>
-                        <a:rPr lang="fr-FR" sz="1100" b="0" i="1" smtClean="0">
-                          <a:latin typeface="Cambria Math" panose="02040503050406030204" pitchFamily="18" charset="0"/>
-                        </a:rPr>
-                        <m:t>𝜃</m:t>
-                      </m:r>
-                      <m:r>
-                        <a:rPr lang="fr-FR" sz="1100" b="0" i="1" smtClean="0">
-                          <a:latin typeface="Cambria Math" panose="02040503050406030204" pitchFamily="18" charset="0"/>
-                        </a:rPr>
-                        <m:t>)</m:t>
-                      </m:r>
-                    </m:oMath>
-                  </m:oMathPara>
-                </a14:m>
-                <a:endParaRPr lang="fr-CA" sz="1100" dirty="0"/>
-              </a:p>
-            </p:txBody>
-          </p:sp>
-        </mc:Choice>
-        <mc:Fallback xmlns="">
-          <p:sp>
-            <p:nvSpPr>
-              <p:cNvPr id="42" name="TextBox 41">
-                <a:extLst>
-                  <a:ext uri="{FF2B5EF4-FFF2-40B4-BE49-F238E27FC236}">
-                    <a16:creationId xmlns:a16="http://schemas.microsoft.com/office/drawing/2014/main" id="{0BDBCBFB-2348-3047-9BD0-F7589E4E44F6}"/>
-                  </a:ext>
-                </a:extLst>
-              </p:cNvPr>
-              <p:cNvSpPr txBox="1">
-                <a:spLocks noRot="1" noChangeAspect="1" noMove="1" noResize="1" noEditPoints="1" noAdjustHandles="1" noChangeArrowheads="1" noChangeShapeType="1" noTextEdit="1"/>
-              </p:cNvSpPr>
-              <p:nvPr/>
-            </p:nvSpPr>
-            <p:spPr>
-              <a:xfrm rot="16200000">
-                <a:off x="5699375" y="3680073"/>
-                <a:ext cx="618374" cy="261610"/>
-              </a:xfrm>
-              <a:prstGeom prst="rect">
-                <a:avLst/>
-              </a:prstGeom>
-              <a:blipFill>
-                <a:blip r:embed="rId4"/>
-                <a:stretch>
-                  <a:fillRect r="-4545"/>
-                </a:stretch>
-              </a:blipFill>
-            </p:spPr>
-            <p:txBody>
-              <a:bodyPr/>
-              <a:lstStyle/>
-              <a:p>
-                <a:r>
-                  <a:rPr lang="fr-CA">
-                    <a:noFill/>
-                  </a:rPr>
-                  <a:t> </a:t>
-                </a:r>
-              </a:p>
-            </p:txBody>
-          </p:sp>
-        </mc:Fallback>
-      </mc:AlternateContent>
-      <mc:AlternateContent xmlns:mc="http://schemas.openxmlformats.org/markup-compatibility/2006" xmlns:a14="http://schemas.microsoft.com/office/drawing/2010/main">
-        <mc:Choice Requires="a14">
-          <p:sp>
-            <p:nvSpPr>
-              <p:cNvPr id="43" name="TextBox 42">
-                <a:extLst>
-                  <a:ext uri="{FF2B5EF4-FFF2-40B4-BE49-F238E27FC236}">
-                    <a16:creationId xmlns:a16="http://schemas.microsoft.com/office/drawing/2014/main" id="{107CC927-2752-1A48-B00C-458D93592B67}"/>
-                  </a:ext>
-                </a:extLst>
-              </p:cNvPr>
-              <p:cNvSpPr txBox="1"/>
-              <p:nvPr/>
-            </p:nvSpPr>
-            <p:spPr>
-              <a:xfrm>
-                <a:off x="3943759" y="2543956"/>
-                <a:ext cx="597536" cy="261610"/>
-              </a:xfrm>
-              <a:prstGeom prst="rect">
-                <a:avLst/>
-              </a:prstGeom>
-              <a:noFill/>
-            </p:spPr>
-            <p:txBody>
-              <a:bodyPr wrap="none" rtlCol="0">
-                <a:spAutoFit/>
-              </a:bodyPr>
-              <a:lstStyle/>
-              <a:p>
-                <a:pPr/>
-                <a14:m>
-                  <m:oMathPara xmlns:m="http://schemas.openxmlformats.org/officeDocument/2006/math">
-                    <m:oMathParaPr>
-                      <m:jc m:val="centerGroup"/>
-                    </m:oMathParaPr>
-                    <m:oMath xmlns:m="http://schemas.openxmlformats.org/officeDocument/2006/math">
-                      <m:r>
-                        <m:rPr>
-                          <m:sty m:val="p"/>
-                        </m:rPr>
-                        <a:rPr lang="fr-FR" sz="1100" b="0" i="0" smtClean="0">
-                          <a:latin typeface="Cambria Math" panose="02040503050406030204" pitchFamily="18" charset="0"/>
-                        </a:rPr>
-                        <m:t>sin</m:t>
-                      </m:r>
-                      <m:r>
-                        <a:rPr lang="fr-FR" sz="1100" b="0" i="1" smtClean="0">
-                          <a:latin typeface="Cambria Math" panose="02040503050406030204" pitchFamily="18" charset="0"/>
-                        </a:rPr>
-                        <m:t>⁡(</m:t>
-                      </m:r>
-                      <m:r>
-                        <a:rPr lang="fr-FR" sz="1100" b="0" i="1" smtClean="0">
-                          <a:latin typeface="Cambria Math" panose="02040503050406030204" pitchFamily="18" charset="0"/>
-                        </a:rPr>
-                        <m:t>𝜃</m:t>
-                      </m:r>
-                      <m:r>
-                        <a:rPr lang="fr-FR" sz="1100" b="0" i="1" smtClean="0">
-                          <a:latin typeface="Cambria Math" panose="02040503050406030204" pitchFamily="18" charset="0"/>
-                        </a:rPr>
-                        <m:t>)</m:t>
-                      </m:r>
-                    </m:oMath>
-                  </m:oMathPara>
-                </a14:m>
-                <a:endParaRPr lang="fr-CA" sz="1100" dirty="0"/>
-              </a:p>
-            </p:txBody>
-          </p:sp>
-        </mc:Choice>
-        <mc:Fallback xmlns="">
-          <p:sp>
-            <p:nvSpPr>
-              <p:cNvPr id="43" name="TextBox 42">
-                <a:extLst>
-                  <a:ext uri="{FF2B5EF4-FFF2-40B4-BE49-F238E27FC236}">
-                    <a16:creationId xmlns:a16="http://schemas.microsoft.com/office/drawing/2014/main" id="{107CC927-2752-1A48-B00C-458D93592B67}"/>
-                  </a:ext>
-                </a:extLst>
-              </p:cNvPr>
-              <p:cNvSpPr txBox="1">
-                <a:spLocks noRot="1" noChangeAspect="1" noMove="1" noResize="1" noEditPoints="1" noAdjustHandles="1" noChangeArrowheads="1" noChangeShapeType="1" noTextEdit="1"/>
-              </p:cNvSpPr>
-              <p:nvPr/>
-            </p:nvSpPr>
-            <p:spPr>
-              <a:xfrm>
-                <a:off x="3943759" y="2543956"/>
-                <a:ext cx="597536" cy="261610"/>
-              </a:xfrm>
-              <a:prstGeom prst="rect">
-                <a:avLst/>
-              </a:prstGeom>
-              <a:blipFill>
-                <a:blip r:embed="rId5"/>
-                <a:stretch>
-                  <a:fillRect b="-9524"/>
-                </a:stretch>
-              </a:blipFill>
-            </p:spPr>
-            <p:txBody>
-              <a:bodyPr/>
-              <a:lstStyle/>
-              <a:p>
-                <a:r>
-                  <a:rPr lang="fr-CA">
-                    <a:noFill/>
-                  </a:rPr>
-                  <a:t> </a:t>
-                </a:r>
-              </a:p>
-            </p:txBody>
-          </p:sp>
-        </mc:Fallback>
-      </mc:AlternateContent>
-      <p:sp>
-        <p:nvSpPr>
-          <p:cNvPr id="44" name="TextBox 43">
-            <a:extLst>
-              <a:ext uri="{FF2B5EF4-FFF2-40B4-BE49-F238E27FC236}">
-                <a16:creationId xmlns:a16="http://schemas.microsoft.com/office/drawing/2014/main" id="{B3096E3D-C2F5-C64C-9BBC-C162798DF26C}"/>
+                <a16:creationId xmlns:a16="http://schemas.microsoft.com/office/drawing/2014/main" id="{479BE1A4-9594-564C-83D6-10ADB21886D4}"/>
               </a:ext>
             </a:extLst>
           </p:cNvPr>
@@ -19614,7 +20634,7 @@
         </p:nvSpPr>
         <p:spPr>
           <a:xfrm>
-            <a:off x="6273637" y="3379328"/>
+            <a:off x="9562370" y="2872470"/>
             <a:ext cx="284052" cy="369332"/>
           </a:xfrm>
           <a:prstGeom prst="rect">
@@ -19641,10 +20661,10 @@
       </p:sp>
       <p:sp>
         <p:nvSpPr>
-          <p:cNvPr id="45" name="TextBox 44">
+          <p:cNvPr id="58" name="TextBox 57">
             <a:extLst>
               <a:ext uri="{FF2B5EF4-FFF2-40B4-BE49-F238E27FC236}">
-                <a16:creationId xmlns:a16="http://schemas.microsoft.com/office/drawing/2014/main" id="{8D615CE7-445E-EB41-B4A6-9ACE65DF7F1B}"/>
+                <a16:creationId xmlns:a16="http://schemas.microsoft.com/office/drawing/2014/main" id="{8644C598-FC1E-5D47-A128-40FD81E19C1C}"/>
               </a:ext>
             </a:extLst>
           </p:cNvPr>
@@ -19653,7 +20673,7 @@
         </p:nvSpPr>
         <p:spPr>
           <a:xfrm>
-            <a:off x="4323266" y="1372507"/>
+            <a:off x="7488429" y="865649"/>
             <a:ext cx="288862" cy="369332"/>
           </a:xfrm>
           <a:prstGeom prst="rect">
@@ -19678,252 +20698,12 @@
           </a:p>
         </p:txBody>
       </p:sp>
-      <mc:AlternateContent xmlns:mc="http://schemas.openxmlformats.org/markup-compatibility/2006" xmlns:a14="http://schemas.microsoft.com/office/drawing/2010/main">
-        <mc:Choice Requires="a14">
-          <p:sp>
-            <p:nvSpPr>
-              <p:cNvPr id="46" name="TextBox 45">
-                <a:extLst>
-                  <a:ext uri="{FF2B5EF4-FFF2-40B4-BE49-F238E27FC236}">
-                    <a16:creationId xmlns:a16="http://schemas.microsoft.com/office/drawing/2014/main" id="{424FF002-D999-2644-BC8E-7BAAF31B4D84}"/>
-                  </a:ext>
-                </a:extLst>
-              </p:cNvPr>
-              <p:cNvSpPr txBox="1"/>
-              <p:nvPr/>
-            </p:nvSpPr>
-            <p:spPr>
-              <a:xfrm rot="16200000">
-                <a:off x="3211602" y="3709177"/>
-                <a:ext cx="703334" cy="261610"/>
-              </a:xfrm>
-              <a:prstGeom prst="rect">
-                <a:avLst/>
-              </a:prstGeom>
-              <a:noFill/>
-            </p:spPr>
-            <p:txBody>
-              <a:bodyPr wrap="none" rtlCol="0">
-                <a:spAutoFit/>
-              </a:bodyPr>
-              <a:lstStyle/>
-              <a:p>
-                <a:pPr/>
-                <a14:m>
-                  <m:oMathPara xmlns:m="http://schemas.openxmlformats.org/officeDocument/2006/math">
-                    <m:oMathParaPr>
-                      <m:jc m:val="centerGroup"/>
-                    </m:oMathParaPr>
-                    <m:oMath xmlns:m="http://schemas.openxmlformats.org/officeDocument/2006/math">
-                      <m:r>
-                        <a:rPr lang="fr-FR" sz="1100" b="0" i="0" smtClean="0">
-                          <a:latin typeface="Cambria Math" panose="02040503050406030204" pitchFamily="18" charset="0"/>
-                        </a:rPr>
-                        <m:t>−</m:t>
-                      </m:r>
-                      <m:r>
-                        <m:rPr>
-                          <m:sty m:val="p"/>
-                        </m:rPr>
-                        <a:rPr lang="fr-FR" sz="1100" b="0" i="0" smtClean="0">
-                          <a:latin typeface="Cambria Math" panose="02040503050406030204" pitchFamily="18" charset="0"/>
-                        </a:rPr>
-                        <m:t>sin</m:t>
-                      </m:r>
-                      <m:r>
-                        <a:rPr lang="fr-FR" sz="1100" b="0" i="1" smtClean="0">
-                          <a:latin typeface="Cambria Math" panose="02040503050406030204" pitchFamily="18" charset="0"/>
-                        </a:rPr>
-                        <m:t>⁡(</m:t>
-                      </m:r>
-                      <m:r>
-                        <a:rPr lang="fr-FR" sz="1100" b="0" i="1" smtClean="0">
-                          <a:latin typeface="Cambria Math" panose="02040503050406030204" pitchFamily="18" charset="0"/>
-                        </a:rPr>
-                        <m:t>𝜃</m:t>
-                      </m:r>
-                      <m:r>
-                        <a:rPr lang="fr-FR" sz="1100" b="0" i="1" smtClean="0">
-                          <a:latin typeface="Cambria Math" panose="02040503050406030204" pitchFamily="18" charset="0"/>
-                        </a:rPr>
-                        <m:t>)</m:t>
-                      </m:r>
-                    </m:oMath>
-                  </m:oMathPara>
-                </a14:m>
-                <a:endParaRPr lang="fr-CA" sz="1100" dirty="0"/>
-              </a:p>
-            </p:txBody>
-          </p:sp>
-        </mc:Choice>
-        <mc:Fallback xmlns="">
-          <p:sp>
-            <p:nvSpPr>
-              <p:cNvPr id="46" name="TextBox 45">
-                <a:extLst>
-                  <a:ext uri="{FF2B5EF4-FFF2-40B4-BE49-F238E27FC236}">
-                    <a16:creationId xmlns:a16="http://schemas.microsoft.com/office/drawing/2014/main" id="{424FF002-D999-2644-BC8E-7BAAF31B4D84}"/>
-                  </a:ext>
-                </a:extLst>
-              </p:cNvPr>
-              <p:cNvSpPr txBox="1">
-                <a:spLocks noRot="1" noChangeAspect="1" noMove="1" noResize="1" noEditPoints="1" noAdjustHandles="1" noChangeArrowheads="1" noChangeShapeType="1" noTextEdit="1"/>
-              </p:cNvSpPr>
-              <p:nvPr/>
-            </p:nvSpPr>
-            <p:spPr>
-              <a:xfrm rot="16200000">
-                <a:off x="3211602" y="3709177"/>
-                <a:ext cx="703334" cy="261610"/>
-              </a:xfrm>
-              <a:prstGeom prst="rect">
-                <a:avLst/>
-              </a:prstGeom>
-              <a:blipFill>
-                <a:blip r:embed="rId6"/>
-                <a:stretch>
-                  <a:fillRect r="-4762"/>
-                </a:stretch>
-              </a:blipFill>
-            </p:spPr>
-            <p:txBody>
-              <a:bodyPr/>
-              <a:lstStyle/>
-              <a:p>
-                <a:r>
-                  <a:rPr lang="fr-CA">
-                    <a:noFill/>
-                  </a:rPr>
-                  <a:t> </a:t>
-                </a:r>
-              </a:p>
-            </p:txBody>
-          </p:sp>
-        </mc:Fallback>
-      </mc:AlternateContent>
-      <mc:AlternateContent xmlns:mc="http://schemas.openxmlformats.org/markup-compatibility/2006" xmlns:a14="http://schemas.microsoft.com/office/drawing/2010/main">
-        <mc:Choice Requires="a14">
-          <p:sp>
-            <p:nvSpPr>
-              <p:cNvPr id="47" name="TextBox 46">
-                <a:extLst>
-                  <a:ext uri="{FF2B5EF4-FFF2-40B4-BE49-F238E27FC236}">
-                    <a16:creationId xmlns:a16="http://schemas.microsoft.com/office/drawing/2014/main" id="{565FED7E-6947-3D41-9E1E-BA51EEF89A04}"/>
-                  </a:ext>
-                </a:extLst>
-              </p:cNvPr>
-              <p:cNvSpPr txBox="1"/>
-              <p:nvPr/>
-            </p:nvSpPr>
-            <p:spPr>
-              <a:xfrm>
-                <a:off x="4418125" y="1872249"/>
-                <a:ext cx="618374" cy="261610"/>
-              </a:xfrm>
-              <a:prstGeom prst="rect">
-                <a:avLst/>
-              </a:prstGeom>
-              <a:noFill/>
-            </p:spPr>
-            <p:txBody>
-              <a:bodyPr wrap="none" rtlCol="0">
-                <a:spAutoFit/>
-              </a:bodyPr>
-              <a:lstStyle/>
-              <a:p>
-                <a:pPr/>
-                <a14:m>
-                  <m:oMathPara xmlns:m="http://schemas.openxmlformats.org/officeDocument/2006/math">
-                    <m:oMathParaPr>
-                      <m:jc m:val="centerGroup"/>
-                    </m:oMathParaPr>
-                    <m:oMath xmlns:m="http://schemas.openxmlformats.org/officeDocument/2006/math">
-                      <m:r>
-                        <m:rPr>
-                          <m:sty m:val="p"/>
-                        </m:rPr>
-                        <a:rPr lang="fr-FR" sz="1100" b="0" i="0" smtClean="0">
-                          <a:latin typeface="Cambria Math" panose="02040503050406030204" pitchFamily="18" charset="0"/>
-                        </a:rPr>
-                        <m:t>cos</m:t>
-                      </m:r>
-                      <m:r>
-                        <a:rPr lang="fr-FR" sz="1100" b="0" i="1" smtClean="0">
-                          <a:latin typeface="Cambria Math" panose="02040503050406030204" pitchFamily="18" charset="0"/>
-                        </a:rPr>
-                        <m:t>⁡(</m:t>
-                      </m:r>
-                      <m:r>
-                        <a:rPr lang="fr-FR" sz="1100" b="0" i="1" smtClean="0">
-                          <a:latin typeface="Cambria Math" panose="02040503050406030204" pitchFamily="18" charset="0"/>
-                        </a:rPr>
-                        <m:t>𝜃</m:t>
-                      </m:r>
-                      <m:r>
-                        <a:rPr lang="fr-FR" sz="1100" b="0" i="1" smtClean="0">
-                          <a:latin typeface="Cambria Math" panose="02040503050406030204" pitchFamily="18" charset="0"/>
-                        </a:rPr>
-                        <m:t>)</m:t>
-                      </m:r>
-                    </m:oMath>
-                  </m:oMathPara>
-                </a14:m>
-                <a:endParaRPr lang="fr-CA" sz="1100" dirty="0"/>
-              </a:p>
-            </p:txBody>
-          </p:sp>
-        </mc:Choice>
-        <mc:Fallback xmlns="">
-          <p:sp>
-            <p:nvSpPr>
-              <p:cNvPr id="47" name="TextBox 46">
-                <a:extLst>
-                  <a:ext uri="{FF2B5EF4-FFF2-40B4-BE49-F238E27FC236}">
-                    <a16:creationId xmlns:a16="http://schemas.microsoft.com/office/drawing/2014/main" id="{565FED7E-6947-3D41-9E1E-BA51EEF89A04}"/>
-                  </a:ext>
-                </a:extLst>
-              </p:cNvPr>
-              <p:cNvSpPr txBox="1">
-                <a:spLocks noRot="1" noChangeAspect="1" noMove="1" noResize="1" noEditPoints="1" noAdjustHandles="1" noChangeArrowheads="1" noChangeShapeType="1" noTextEdit="1"/>
-              </p:cNvSpPr>
-              <p:nvPr/>
-            </p:nvSpPr>
-            <p:spPr>
-              <a:xfrm>
-                <a:off x="4418125" y="1872249"/>
-                <a:ext cx="618374" cy="261610"/>
-              </a:xfrm>
-              <a:prstGeom prst="rect">
-                <a:avLst/>
-              </a:prstGeom>
-              <a:blipFill>
-                <a:blip r:embed="rId7"/>
-                <a:stretch>
-                  <a:fillRect b="-9524"/>
-                </a:stretch>
-              </a:blipFill>
-            </p:spPr>
-            <p:txBody>
-              <a:bodyPr/>
-              <a:lstStyle/>
-              <a:p>
-                <a:r>
-                  <a:rPr lang="fr-CA">
-                    <a:noFill/>
-                  </a:rPr>
-                  <a:t> </a:t>
-                </a:r>
-              </a:p>
-            </p:txBody>
-          </p:sp>
-        </mc:Fallback>
-      </mc:AlternateContent>
       <p:sp>
         <p:nvSpPr>
-          <p:cNvPr id="48" name="TextBox 47">
+          <p:cNvPr id="61" name="TextBox 60">
             <a:extLst>
               <a:ext uri="{FF2B5EF4-FFF2-40B4-BE49-F238E27FC236}">
-                <a16:creationId xmlns:a16="http://schemas.microsoft.com/office/drawing/2014/main" id="{62AD6633-58C6-9F41-9D05-275E846B3C80}"/>
+                <a16:creationId xmlns:a16="http://schemas.microsoft.com/office/drawing/2014/main" id="{634B2CCD-06E4-7445-84BA-39269C6FC27C}"/>
               </a:ext>
             </a:extLst>
           </p:cNvPr>
@@ -19932,7 +20712,102 @@
         </p:nvSpPr>
         <p:spPr>
           <a:xfrm rot="19800000">
-            <a:off x="5022179" y="2793344"/>
+            <a:off x="8398533" y="2399264"/>
+            <a:ext cx="418704" cy="369332"/>
+          </a:xfrm>
+          <a:prstGeom prst="rect">
+            <a:avLst/>
+          </a:prstGeom>
+          <a:noFill/>
+        </p:spPr>
+        <p:txBody>
+          <a:bodyPr wrap="none" rtlCol="0">
+            <a:spAutoFit/>
+          </a:bodyPr>
+          <a:lstStyle/>
+          <a:p>
+            <a:r>
+              <a:rPr lang="fr-CA" noProof="1">
+                <a:solidFill>
+                  <a:srgbClr val="FF0000"/>
+                </a:solidFill>
+              </a:rPr>
+              <a:t>10</a:t>
+            </a:r>
+          </a:p>
+        </p:txBody>
+      </p:sp>
+      <p:sp>
+        <p:nvSpPr>
+          <p:cNvPr id="71" name="Oval 70">
+            <a:extLst>
+              <a:ext uri="{FF2B5EF4-FFF2-40B4-BE49-F238E27FC236}">
+                <a16:creationId xmlns:a16="http://schemas.microsoft.com/office/drawing/2014/main" id="{1CBFB0F0-EFE9-C648-9AC9-06F3D7FF876D}"/>
+              </a:ext>
+            </a:extLst>
+          </p:cNvPr>
+          <p:cNvSpPr>
+            <a:spLocks noChangeAspect="1"/>
+          </p:cNvSpPr>
+          <p:nvPr/>
+        </p:nvSpPr>
+        <p:spPr>
+          <a:xfrm>
+            <a:off x="9237265" y="2275282"/>
+            <a:ext cx="108000" cy="108000"/>
+          </a:xfrm>
+          <a:prstGeom prst="ellipse">
+            <a:avLst/>
+          </a:prstGeom>
+          <a:solidFill>
+            <a:schemeClr val="tx1"/>
+          </a:solidFill>
+          <a:ln w="38100">
+            <a:solidFill>
+              <a:schemeClr val="tx1"/>
+            </a:solidFill>
+          </a:ln>
+        </p:spPr>
+        <p:style>
+          <a:lnRef idx="2">
+            <a:schemeClr val="accent1">
+              <a:shade val="50000"/>
+            </a:schemeClr>
+          </a:lnRef>
+          <a:fillRef idx="1">
+            <a:schemeClr val="accent1"/>
+          </a:fillRef>
+          <a:effectRef idx="0">
+            <a:schemeClr val="accent1"/>
+          </a:effectRef>
+          <a:fontRef idx="minor">
+            <a:schemeClr val="lt1"/>
+          </a:fontRef>
+        </p:style>
+        <p:txBody>
+          <a:bodyPr rtlCol="0" anchor="ctr"/>
+          <a:lstStyle/>
+          <a:p>
+            <a:pPr algn="ctr"/>
+            <a:endParaRPr lang="fr-CA" sz="2400" noProof="1"/>
+          </a:p>
+        </p:txBody>
+      </p:sp>
+      <p:sp>
+        <p:nvSpPr>
+          <p:cNvPr id="72" name="TextBox 71">
+            <a:extLst>
+              <a:ext uri="{FF2B5EF4-FFF2-40B4-BE49-F238E27FC236}">
+                <a16:creationId xmlns:a16="http://schemas.microsoft.com/office/drawing/2014/main" id="{56A29412-D72F-A34B-85A7-AD9889726AD4}"/>
+              </a:ext>
+            </a:extLst>
+          </p:cNvPr>
+          <p:cNvSpPr txBox="1"/>
+          <p:nvPr/>
+        </p:nvSpPr>
+        <p:spPr>
+          <a:xfrm>
+            <a:off x="7737286" y="3014104"/>
             <a:ext cx="301686" cy="369332"/>
           </a:xfrm>
           <a:prstGeom prst="rect">
@@ -19952,50 +20827,261 @@
                   <a:srgbClr val="FF0000"/>
                 </a:solidFill>
               </a:rPr>
-              <a:t>1</a:t>
+              <a:t>2</a:t>
             </a:r>
           </a:p>
         </p:txBody>
       </p:sp>
-      <p:sp>
-        <p:nvSpPr>
-          <p:cNvPr id="49" name="TextBox 48">
-            <a:extLst>
-              <a:ext uri="{FF2B5EF4-FFF2-40B4-BE49-F238E27FC236}">
-                <a16:creationId xmlns:a16="http://schemas.microsoft.com/office/drawing/2014/main" id="{865FEE61-21B8-C24D-B774-E00074F21274}"/>
-              </a:ext>
-            </a:extLst>
-          </p:cNvPr>
-          <p:cNvSpPr txBox="1"/>
-          <p:nvPr/>
-        </p:nvSpPr>
-        <p:spPr>
-          <a:xfrm rot="19800000">
-            <a:off x="3759417" y="2700542"/>
-            <a:ext cx="301686" cy="369332"/>
-          </a:xfrm>
-          <a:prstGeom prst="rect">
-            <a:avLst/>
-          </a:prstGeom>
-          <a:noFill/>
-        </p:spPr>
-        <p:txBody>
-          <a:bodyPr wrap="none" rtlCol="0">
-            <a:spAutoFit/>
-          </a:bodyPr>
-          <a:lstStyle/>
-          <a:p>
-            <a:r>
-              <a:rPr lang="fr-CA" noProof="1">
-                <a:solidFill>
-                  <a:srgbClr val="00A000"/>
-                </a:solidFill>
-              </a:rPr>
-              <a:t>1</a:t>
-            </a:r>
-          </a:p>
-        </p:txBody>
-      </p:sp>
+      <mc:AlternateContent xmlns:mc="http://schemas.openxmlformats.org/markup-compatibility/2006">
+        <mc:Choice xmlns:a14="http://schemas.microsoft.com/office/drawing/2010/main" Requires="a14">
+          <p:sp>
+            <p:nvSpPr>
+              <p:cNvPr id="73" name="TextBox 72">
+                <a:extLst>
+                  <a:ext uri="{FF2B5EF4-FFF2-40B4-BE49-F238E27FC236}">
+                    <a16:creationId xmlns:a16="http://schemas.microsoft.com/office/drawing/2014/main" id="{B2EC8099-68F8-1C48-BA98-2C43348E7EC9}"/>
+                  </a:ext>
+                </a:extLst>
+              </p:cNvPr>
+              <p:cNvSpPr txBox="1"/>
+              <p:nvPr/>
+            </p:nvSpPr>
+            <p:spPr>
+              <a:xfrm>
+                <a:off x="8771699" y="3074700"/>
+                <a:ext cx="1039131" cy="261610"/>
+              </a:xfrm>
+              <a:prstGeom prst="rect">
+                <a:avLst/>
+              </a:prstGeom>
+              <a:noFill/>
+            </p:spPr>
+            <p:txBody>
+              <a:bodyPr wrap="none" rtlCol="0">
+                <a:spAutoFit/>
+              </a:bodyPr>
+              <a:lstStyle/>
+              <a:p>
+                <a:pPr/>
+                <a:r>
+                  <a:rPr lang="fr-FR" sz="1100" b="0" dirty="0"/>
+                  <a:t>2 + 10</a:t>
+                </a:r>
+                <a14:m>
+                  <m:oMath xmlns:m="http://schemas.openxmlformats.org/officeDocument/2006/math">
+                    <m:func>
+                      <m:funcPr>
+                        <m:ctrlPr>
+                          <a:rPr lang="fr-FR" sz="1100" b="0" i="1" smtClean="0">
+                            <a:latin typeface="Cambria Math" panose="02040503050406030204" pitchFamily="18" charset="0"/>
+                          </a:rPr>
+                        </m:ctrlPr>
+                      </m:funcPr>
+                      <m:fName>
+                        <m:r>
+                          <a:rPr lang="fr-FR" sz="1100" b="0" i="0" smtClean="0">
+                            <a:latin typeface="Cambria Math" panose="02040503050406030204" pitchFamily="18" charset="0"/>
+                          </a:rPr>
+                          <m:t> </m:t>
+                        </m:r>
+                        <m:r>
+                          <m:rPr>
+                            <m:sty m:val="p"/>
+                          </m:rPr>
+                          <a:rPr lang="fr-FR" sz="1100" b="0" i="0" smtClean="0">
+                            <a:latin typeface="Cambria Math" panose="02040503050406030204" pitchFamily="18" charset="0"/>
+                          </a:rPr>
+                          <m:t>cos</m:t>
+                        </m:r>
+                      </m:fName>
+                      <m:e>
+                        <m:d>
+                          <m:dPr>
+                            <m:ctrlPr>
+                              <a:rPr lang="fr-FR" sz="1100" b="0" i="1" smtClean="0">
+                                <a:latin typeface="Cambria Math" panose="02040503050406030204" pitchFamily="18" charset="0"/>
+                              </a:rPr>
+                            </m:ctrlPr>
+                          </m:dPr>
+                          <m:e>
+                            <m:r>
+                              <a:rPr lang="fr-FR" sz="1100" b="0" i="1" smtClean="0">
+                                <a:latin typeface="Cambria Math" panose="02040503050406030204" pitchFamily="18" charset="0"/>
+                              </a:rPr>
+                              <m:t>30</m:t>
+                            </m:r>
+                          </m:e>
+                        </m:d>
+                      </m:e>
+                    </m:func>
+                  </m:oMath>
+                </a14:m>
+                <a:endParaRPr lang="fr-CA" sz="1100" dirty="0"/>
+              </a:p>
+            </p:txBody>
+          </p:sp>
+        </mc:Choice>
+        <mc:Fallback>
+          <p:sp>
+            <p:nvSpPr>
+              <p:cNvPr id="73" name="TextBox 72">
+                <a:extLst>
+                  <a:ext uri="{FF2B5EF4-FFF2-40B4-BE49-F238E27FC236}">
+                    <a16:creationId xmlns:a16="http://schemas.microsoft.com/office/drawing/2014/main" id="{B2EC8099-68F8-1C48-BA98-2C43348E7EC9}"/>
+                  </a:ext>
+                </a:extLst>
+              </p:cNvPr>
+              <p:cNvSpPr txBox="1">
+                <a:spLocks noRot="1" noChangeAspect="1" noMove="1" noResize="1" noEditPoints="1" noAdjustHandles="1" noChangeArrowheads="1" noChangeShapeType="1" noTextEdit="1"/>
+              </p:cNvSpPr>
+              <p:nvPr/>
+            </p:nvSpPr>
+            <p:spPr>
+              <a:xfrm>
+                <a:off x="8771699" y="3074700"/>
+                <a:ext cx="1039131" cy="261610"/>
+              </a:xfrm>
+              <a:prstGeom prst="rect">
+                <a:avLst/>
+              </a:prstGeom>
+              <a:blipFill>
+                <a:blip r:embed="rId8"/>
+                <a:stretch>
+                  <a:fillRect b="-13636"/>
+                </a:stretch>
+              </a:blipFill>
+            </p:spPr>
+            <p:txBody>
+              <a:bodyPr/>
+              <a:lstStyle/>
+              <a:p>
+                <a:r>
+                  <a:rPr lang="fr-CA">
+                    <a:noFill/>
+                  </a:rPr>
+                  <a:t> </a:t>
+                </a:r>
+              </a:p>
+            </p:txBody>
+          </p:sp>
+        </mc:Fallback>
+      </mc:AlternateContent>
+      <mc:AlternateContent xmlns:mc="http://schemas.openxmlformats.org/markup-compatibility/2006">
+        <mc:Choice xmlns:a14="http://schemas.microsoft.com/office/drawing/2010/main" Requires="a14">
+          <p:sp>
+            <p:nvSpPr>
+              <p:cNvPr id="74" name="TextBox 73">
+                <a:extLst>
+                  <a:ext uri="{FF2B5EF4-FFF2-40B4-BE49-F238E27FC236}">
+                    <a16:creationId xmlns:a16="http://schemas.microsoft.com/office/drawing/2014/main" id="{1DF67601-A6CA-5549-A17C-B0D58288280F}"/>
+                  </a:ext>
+                </a:extLst>
+              </p:cNvPr>
+              <p:cNvSpPr txBox="1"/>
+              <p:nvPr/>
+            </p:nvSpPr>
+            <p:spPr>
+              <a:xfrm>
+                <a:off x="7035062" y="2176166"/>
+                <a:ext cx="782587" cy="261610"/>
+              </a:xfrm>
+              <a:prstGeom prst="rect">
+                <a:avLst/>
+              </a:prstGeom>
+              <a:noFill/>
+            </p:spPr>
+            <p:txBody>
+              <a:bodyPr wrap="none" rtlCol="0">
+                <a:spAutoFit/>
+              </a:bodyPr>
+              <a:lstStyle/>
+              <a:p>
+                <a:pPr/>
+                <a:r>
+                  <a:rPr lang="fr-FR" sz="1100" b="0" dirty="0"/>
+                  <a:t>10</a:t>
+                </a:r>
+                <a14:m>
+                  <m:oMath xmlns:m="http://schemas.openxmlformats.org/officeDocument/2006/math">
+                    <m:r>
+                      <m:rPr>
+                        <m:sty m:val="p"/>
+                      </m:rPr>
+                      <a:rPr lang="fr-FR" sz="1100" b="0" i="0" smtClean="0">
+                        <a:latin typeface="Cambria Math" panose="02040503050406030204" pitchFamily="18" charset="0"/>
+                      </a:rPr>
+                      <m:t>sin</m:t>
+                    </m:r>
+                    <m:r>
+                      <a:rPr lang="fr-FR" sz="1100" b="0" i="1" smtClean="0">
+                        <a:latin typeface="Cambria Math" panose="02040503050406030204" pitchFamily="18" charset="0"/>
+                      </a:rPr>
+                      <m:t>⁡(</m:t>
+                    </m:r>
+                    <m:r>
+                      <a:rPr lang="fr-FR" sz="1100" b="0" i="1" smtClean="0">
+                        <a:latin typeface="Cambria Math" panose="02040503050406030204" pitchFamily="18" charset="0"/>
+                      </a:rPr>
+                      <m:t>30</m:t>
+                    </m:r>
+                    <m:r>
+                      <a:rPr lang="fr-FR" sz="1100" b="0" i="1" smtClean="0">
+                        <a:latin typeface="Cambria Math" panose="02040503050406030204" pitchFamily="18" charset="0"/>
+                      </a:rPr>
+                      <m:t>)</m:t>
+                    </m:r>
+                  </m:oMath>
+                </a14:m>
+                <a:endParaRPr lang="fr-CA" sz="1100" dirty="0"/>
+              </a:p>
+            </p:txBody>
+          </p:sp>
+        </mc:Choice>
+        <mc:Fallback>
+          <p:sp>
+            <p:nvSpPr>
+              <p:cNvPr id="74" name="TextBox 73">
+                <a:extLst>
+                  <a:ext uri="{FF2B5EF4-FFF2-40B4-BE49-F238E27FC236}">
+                    <a16:creationId xmlns:a16="http://schemas.microsoft.com/office/drawing/2014/main" id="{1DF67601-A6CA-5549-A17C-B0D58288280F}"/>
+                  </a:ext>
+                </a:extLst>
+              </p:cNvPr>
+              <p:cNvSpPr txBox="1">
+                <a:spLocks noRot="1" noChangeAspect="1" noMove="1" noResize="1" noEditPoints="1" noAdjustHandles="1" noChangeArrowheads="1" noChangeShapeType="1" noTextEdit="1"/>
+              </p:cNvSpPr>
+              <p:nvPr/>
+            </p:nvSpPr>
+            <p:spPr>
+              <a:xfrm>
+                <a:off x="7035062" y="2176166"/>
+                <a:ext cx="782587" cy="261610"/>
+              </a:xfrm>
+              <a:prstGeom prst="rect">
+                <a:avLst/>
+              </a:prstGeom>
+              <a:blipFill>
+                <a:blip r:embed="rId9"/>
+                <a:stretch>
+                  <a:fillRect b="-14286"/>
+                </a:stretch>
+              </a:blipFill>
+            </p:spPr>
+            <p:txBody>
+              <a:bodyPr/>
+              <a:lstStyle/>
+              <a:p>
+                <a:r>
+                  <a:rPr lang="fr-CA">
+                    <a:noFill/>
+                  </a:rPr>
+                  <a:t> </a:t>
+                </a:r>
+              </a:p>
+            </p:txBody>
+          </p:sp>
+        </mc:Fallback>
+      </mc:AlternateContent>
     </p:spTree>
     <p:extLst>
       <p:ext uri="{BB962C8B-B14F-4D97-AF65-F5344CB8AC3E}">

</xml_diff>